<commit_message>
Updated description of state machine and counter exercises
</commit_message>
<xml_diff>
--- a/fys4220-jbook/images/vhdl_structure.pptx
+++ b/fys4220-jbook/images/vhdl_structure.pptx
@@ -5,7 +5,7 @@
     <p:sldMasterId id="2147483648" r:id="rId1"/>
   </p:sldMasterIdLst>
   <p:notesMasterIdLst>
-    <p:notesMasterId r:id="rId12"/>
+    <p:notesMasterId r:id="rId11"/>
   </p:notesMasterIdLst>
   <p:sldIdLst>
     <p:sldId id="256" r:id="rId2"/>
@@ -17,7 +17,6 @@
     <p:sldId id="259" r:id="rId8"/>
     <p:sldId id="260" r:id="rId9"/>
     <p:sldId id="261" r:id="rId10"/>
-    <p:sldId id="391" r:id="rId11"/>
   </p:sldIdLst>
   <p:sldSz cx="12192000" cy="6858000"/>
   <p:notesSz cx="6858000" cy="9144000"/>
@@ -206,7 +205,7 @@
           <a:p>
             <a:fld id="{A7E309B0-22D0-0745-8DBD-D33B66418F25}" type="datetimeFigureOut">
               <a:rPr lang="en-NO" smtClean="0"/>
-              <a:t>05/09/2022</a:t>
+              <a:t>16/09/2022</a:t>
             </a:fld>
             <a:endParaRPr lang="en-NO"/>
           </a:p>
@@ -791,7 +790,7 @@
           <a:p>
             <a:fld id="{1405CF71-DF37-384A-A207-BB8CFBB832CB}" type="datetimeFigureOut">
               <a:rPr lang="en-US" smtClean="0"/>
-              <a:t>9/5/22</a:t>
+              <a:t>9/16/22</a:t>
             </a:fld>
             <a:endParaRPr lang="en-US"/>
           </a:p>
@@ -991,7 +990,7 @@
           <a:p>
             <a:fld id="{1405CF71-DF37-384A-A207-BB8CFBB832CB}" type="datetimeFigureOut">
               <a:rPr lang="en-US" smtClean="0"/>
-              <a:t>9/5/22</a:t>
+              <a:t>9/16/22</a:t>
             </a:fld>
             <a:endParaRPr lang="en-US"/>
           </a:p>
@@ -1201,7 +1200,7 @@
           <a:p>
             <a:fld id="{1405CF71-DF37-384A-A207-BB8CFBB832CB}" type="datetimeFigureOut">
               <a:rPr lang="en-US" smtClean="0"/>
-              <a:t>9/5/22</a:t>
+              <a:t>9/16/22</a:t>
             </a:fld>
             <a:endParaRPr lang="en-US"/>
           </a:p>
@@ -1401,7 +1400,7 @@
           <a:p>
             <a:fld id="{1405CF71-DF37-384A-A207-BB8CFBB832CB}" type="datetimeFigureOut">
               <a:rPr lang="en-US" smtClean="0"/>
-              <a:t>9/5/22</a:t>
+              <a:t>9/16/22</a:t>
             </a:fld>
             <a:endParaRPr lang="en-US"/>
           </a:p>
@@ -1677,7 +1676,7 @@
           <a:p>
             <a:fld id="{1405CF71-DF37-384A-A207-BB8CFBB832CB}" type="datetimeFigureOut">
               <a:rPr lang="en-US" smtClean="0"/>
-              <a:t>9/5/22</a:t>
+              <a:t>9/16/22</a:t>
             </a:fld>
             <a:endParaRPr lang="en-US"/>
           </a:p>
@@ -1945,7 +1944,7 @@
           <a:p>
             <a:fld id="{1405CF71-DF37-384A-A207-BB8CFBB832CB}" type="datetimeFigureOut">
               <a:rPr lang="en-US" smtClean="0"/>
-              <a:t>9/5/22</a:t>
+              <a:t>9/16/22</a:t>
             </a:fld>
             <a:endParaRPr lang="en-US"/>
           </a:p>
@@ -2360,7 +2359,7 @@
           <a:p>
             <a:fld id="{1405CF71-DF37-384A-A207-BB8CFBB832CB}" type="datetimeFigureOut">
               <a:rPr lang="en-US" smtClean="0"/>
-              <a:t>9/5/22</a:t>
+              <a:t>9/16/22</a:t>
             </a:fld>
             <a:endParaRPr lang="en-US"/>
           </a:p>
@@ -2502,7 +2501,7 @@
           <a:p>
             <a:fld id="{1405CF71-DF37-384A-A207-BB8CFBB832CB}" type="datetimeFigureOut">
               <a:rPr lang="en-US" smtClean="0"/>
-              <a:t>9/5/22</a:t>
+              <a:t>9/16/22</a:t>
             </a:fld>
             <a:endParaRPr lang="en-US"/>
           </a:p>
@@ -2615,7 +2614,7 @@
           <a:p>
             <a:fld id="{1405CF71-DF37-384A-A207-BB8CFBB832CB}" type="datetimeFigureOut">
               <a:rPr lang="en-US" smtClean="0"/>
-              <a:t>9/5/22</a:t>
+              <a:t>9/16/22</a:t>
             </a:fld>
             <a:endParaRPr lang="en-US"/>
           </a:p>
@@ -2928,7 +2927,7 @@
           <a:p>
             <a:fld id="{1405CF71-DF37-384A-A207-BB8CFBB832CB}" type="datetimeFigureOut">
               <a:rPr lang="en-US" smtClean="0"/>
-              <a:t>9/5/22</a:t>
+              <a:t>9/16/22</a:t>
             </a:fld>
             <a:endParaRPr lang="en-US"/>
           </a:p>
@@ -3217,7 +3216,7 @@
           <a:p>
             <a:fld id="{1405CF71-DF37-384A-A207-BB8CFBB832CB}" type="datetimeFigureOut">
               <a:rPr lang="en-US" smtClean="0"/>
-              <a:t>9/5/22</a:t>
+              <a:t>9/16/22</a:t>
             </a:fld>
             <a:endParaRPr lang="en-US"/>
           </a:p>
@@ -3460,7 +3459,7 @@
           <a:p>
             <a:fld id="{1405CF71-DF37-384A-A207-BB8CFBB832CB}" type="datetimeFigureOut">
               <a:rPr lang="en-US" smtClean="0"/>
-              <a:t>9/5/22</a:t>
+              <a:t>9/16/22</a:t>
             </a:fld>
             <a:endParaRPr lang="en-US"/>
           </a:p>
@@ -4536,675 +4535,6 @@
   <p:clrMapOvr>
     <a:masterClrMapping/>
   </p:clrMapOvr>
-</p:sld>
-</file>
-
-<file path=ppt/slides/slide10.xml><?xml version="1.0" encoding="utf-8"?>
-<p:sld xmlns:a="http://schemas.openxmlformats.org/drawingml/2006/main" xmlns:r="http://schemas.openxmlformats.org/officeDocument/2006/relationships" xmlns:p="http://schemas.openxmlformats.org/presentationml/2006/main">
-  <p:cSld>
-    <p:spTree>
-      <p:nvGrpSpPr>
-        <p:cNvPr id="1" name=""/>
-        <p:cNvGrpSpPr/>
-        <p:nvPr/>
-      </p:nvGrpSpPr>
-      <p:grpSpPr>
-        <a:xfrm>
-          <a:off x="0" y="0"/>
-          <a:ext cx="0" cy="0"/>
-          <a:chOff x="0" y="0"/>
-          <a:chExt cx="0" cy="0"/>
-        </a:xfrm>
-      </p:grpSpPr>
-      <p:sp>
-        <p:nvSpPr>
-          <p:cNvPr id="4" name="Rectangle 3">
-            <a:extLst>
-              <a:ext uri="{FF2B5EF4-FFF2-40B4-BE49-F238E27FC236}">
-                <a16:creationId xmlns:a16="http://schemas.microsoft.com/office/drawing/2014/main" id="{5B5E55D8-40C1-DBEC-BD85-2968841C668F}"/>
-              </a:ext>
-            </a:extLst>
-          </p:cNvPr>
-          <p:cNvSpPr/>
-          <p:nvPr/>
-        </p:nvSpPr>
-        <p:spPr bwMode="auto">
-          <a:xfrm>
-            <a:off x="6801301" y="1195831"/>
-            <a:ext cx="3072372" cy="1010028"/>
-          </a:xfrm>
-          <a:prstGeom prst="rect">
-            <a:avLst/>
-          </a:prstGeom>
-          <a:solidFill>
-            <a:schemeClr val="bg2">
-              <a:lumMod val="20000"/>
-              <a:lumOff val="80000"/>
-            </a:schemeClr>
-          </a:solidFill>
-          <a:ln w="25400" cap="flat" cmpd="sng" algn="ctr">
-            <a:solidFill>
-              <a:schemeClr val="tx1"/>
-            </a:solidFill>
-            <a:prstDash val="solid"/>
-            <a:round/>
-            <a:headEnd type="none" w="med" len="med"/>
-            <a:tailEnd type="none" w="med" len="med"/>
-          </a:ln>
-          <a:effectLst/>
-        </p:spPr>
-        <p:txBody>
-          <a:bodyPr vert="horz" wrap="square" lIns="91440" tIns="45720" rIns="91440" bIns="45720" numCol="1" rtlCol="0" anchor="t" anchorCtr="0" compatLnSpc="1">
-            <a:prstTxWarp prst="textNoShape">
-              <a:avLst/>
-            </a:prstTxWarp>
-          </a:bodyPr>
-          <a:lstStyle/>
-          <a:p>
-            <a:pPr defTabSz="914400" eaLnBrk="0" fontAlgn="base" hangingPunct="0">
-              <a:spcBef>
-                <a:spcPct val="0"/>
-              </a:spcBef>
-              <a:spcAft>
-                <a:spcPct val="0"/>
-              </a:spcAft>
-            </a:pPr>
-            <a:endParaRPr lang="en-US" sz="2000" dirty="0">
-              <a:latin typeface="Arial" charset="0"/>
-              <a:ea typeface="ヒラギノ角ゴ Pro W3" charset="-128"/>
-              <a:cs typeface="ヒラギノ角ゴ Pro W3" charset="-128"/>
-            </a:endParaRPr>
-          </a:p>
-        </p:txBody>
-      </p:sp>
-      <p:sp>
-        <p:nvSpPr>
-          <p:cNvPr id="5" name="Rectangle 4">
-            <a:extLst>
-              <a:ext uri="{FF2B5EF4-FFF2-40B4-BE49-F238E27FC236}">
-                <a16:creationId xmlns:a16="http://schemas.microsoft.com/office/drawing/2014/main" id="{4794208D-35E2-F17E-D68A-E6F9C71B02B9}"/>
-              </a:ext>
-            </a:extLst>
-          </p:cNvPr>
-          <p:cNvSpPr/>
-          <p:nvPr/>
-        </p:nvSpPr>
-        <p:spPr bwMode="auto">
-          <a:xfrm>
-            <a:off x="1328756" y="1200927"/>
-            <a:ext cx="2301135" cy="1306746"/>
-          </a:xfrm>
-          <a:prstGeom prst="rect">
-            <a:avLst/>
-          </a:prstGeom>
-          <a:solidFill>
-            <a:schemeClr val="bg2">
-              <a:lumMod val="20000"/>
-              <a:lumOff val="80000"/>
-            </a:schemeClr>
-          </a:solidFill>
-          <a:ln w="25400" cap="flat" cmpd="sng" algn="ctr">
-            <a:solidFill>
-              <a:schemeClr val="tx1"/>
-            </a:solidFill>
-            <a:prstDash val="solid"/>
-            <a:round/>
-            <a:headEnd type="none" w="med" len="med"/>
-            <a:tailEnd type="none" w="med" len="med"/>
-          </a:ln>
-          <a:effectLst/>
-        </p:spPr>
-        <p:txBody>
-          <a:bodyPr vert="horz" wrap="square" lIns="91440" tIns="45720" rIns="91440" bIns="45720" numCol="1" rtlCol="0" anchor="t" anchorCtr="0" compatLnSpc="1">
-            <a:prstTxWarp prst="textNoShape">
-              <a:avLst/>
-            </a:prstTxWarp>
-          </a:bodyPr>
-          <a:lstStyle/>
-          <a:p>
-            <a:pPr defTabSz="914400" eaLnBrk="0" fontAlgn="base" hangingPunct="0">
-              <a:spcBef>
-                <a:spcPct val="0"/>
-              </a:spcBef>
-              <a:spcAft>
-                <a:spcPct val="0"/>
-              </a:spcAft>
-            </a:pPr>
-            <a:endParaRPr lang="en-US" sz="2000" dirty="0">
-              <a:latin typeface="Arial" charset="0"/>
-              <a:ea typeface="ヒラギノ角ゴ Pro W3" charset="-128"/>
-              <a:cs typeface="ヒラギノ角ゴ Pro W3" charset="-128"/>
-            </a:endParaRPr>
-          </a:p>
-        </p:txBody>
-      </p:sp>
-      <p:sp>
-        <p:nvSpPr>
-          <p:cNvPr id="6" name="Rectangle 5">
-            <a:extLst>
-              <a:ext uri="{FF2B5EF4-FFF2-40B4-BE49-F238E27FC236}">
-                <a16:creationId xmlns:a16="http://schemas.microsoft.com/office/drawing/2014/main" id="{37BC08EE-A310-B8F9-739E-0AD449F9C876}"/>
-              </a:ext>
-            </a:extLst>
-          </p:cNvPr>
-          <p:cNvSpPr/>
-          <p:nvPr/>
-        </p:nvSpPr>
-        <p:spPr bwMode="auto">
-          <a:xfrm>
-            <a:off x="1328756" y="3856382"/>
-            <a:ext cx="2301135" cy="1306746"/>
-          </a:xfrm>
-          <a:prstGeom prst="rect">
-            <a:avLst/>
-          </a:prstGeom>
-          <a:solidFill>
-            <a:schemeClr val="bg2">
-              <a:lumMod val="20000"/>
-              <a:lumOff val="80000"/>
-            </a:schemeClr>
-          </a:solidFill>
-          <a:ln w="25400" cap="flat" cmpd="sng" algn="ctr">
-            <a:solidFill>
-              <a:schemeClr val="tx1"/>
-            </a:solidFill>
-            <a:prstDash val="solid"/>
-            <a:round/>
-            <a:headEnd type="none" w="med" len="med"/>
-            <a:tailEnd type="none" w="med" len="med"/>
-          </a:ln>
-          <a:effectLst/>
-        </p:spPr>
-        <p:txBody>
-          <a:bodyPr vert="horz" wrap="square" lIns="91440" tIns="45720" rIns="91440" bIns="45720" numCol="1" rtlCol="0" anchor="t" anchorCtr="0" compatLnSpc="1">
-            <a:prstTxWarp prst="textNoShape">
-              <a:avLst/>
-            </a:prstTxWarp>
-          </a:bodyPr>
-          <a:lstStyle/>
-          <a:p>
-            <a:pPr defTabSz="914400" eaLnBrk="0" fontAlgn="base" hangingPunct="0">
-              <a:spcBef>
-                <a:spcPct val="0"/>
-              </a:spcBef>
-              <a:spcAft>
-                <a:spcPct val="0"/>
-              </a:spcAft>
-            </a:pPr>
-            <a:endParaRPr lang="en-US" sz="2000" dirty="0">
-              <a:latin typeface="Arial" charset="0"/>
-              <a:ea typeface="ヒラギノ角ゴ Pro W3" charset="-128"/>
-              <a:cs typeface="ヒラギノ角ゴ Pro W3" charset="-128"/>
-            </a:endParaRPr>
-          </a:p>
-        </p:txBody>
-      </p:sp>
-      <p:sp>
-        <p:nvSpPr>
-          <p:cNvPr id="7" name="Rectangle 6">
-            <a:extLst>
-              <a:ext uri="{FF2B5EF4-FFF2-40B4-BE49-F238E27FC236}">
-                <a16:creationId xmlns:a16="http://schemas.microsoft.com/office/drawing/2014/main" id="{B5337AE8-C769-15D9-1954-BC8695736931}"/>
-              </a:ext>
-            </a:extLst>
-          </p:cNvPr>
-          <p:cNvSpPr/>
-          <p:nvPr/>
-        </p:nvSpPr>
-        <p:spPr bwMode="auto">
-          <a:xfrm>
-            <a:off x="6801301" y="3856382"/>
-            <a:ext cx="2301135" cy="1306746"/>
-          </a:xfrm>
-          <a:prstGeom prst="rect">
-            <a:avLst/>
-          </a:prstGeom>
-          <a:solidFill>
-            <a:schemeClr val="bg2">
-              <a:lumMod val="20000"/>
-              <a:lumOff val="80000"/>
-            </a:schemeClr>
-          </a:solidFill>
-          <a:ln w="25400" cap="flat" cmpd="sng" algn="ctr">
-            <a:solidFill>
-              <a:schemeClr val="tx1"/>
-            </a:solidFill>
-            <a:prstDash val="solid"/>
-            <a:round/>
-            <a:headEnd type="none" w="med" len="med"/>
-            <a:tailEnd type="none" w="med" len="med"/>
-          </a:ln>
-          <a:effectLst/>
-        </p:spPr>
-        <p:txBody>
-          <a:bodyPr vert="horz" wrap="square" lIns="91440" tIns="45720" rIns="91440" bIns="45720" numCol="1" rtlCol="0" anchor="t" anchorCtr="0" compatLnSpc="1">
-            <a:prstTxWarp prst="textNoShape">
-              <a:avLst/>
-            </a:prstTxWarp>
-          </a:bodyPr>
-          <a:lstStyle/>
-          <a:p>
-            <a:pPr defTabSz="914400" eaLnBrk="0" fontAlgn="base" hangingPunct="0">
-              <a:spcBef>
-                <a:spcPct val="0"/>
-              </a:spcBef>
-              <a:spcAft>
-                <a:spcPct val="0"/>
-              </a:spcAft>
-            </a:pPr>
-            <a:endParaRPr lang="en-US" sz="2000" dirty="0">
-              <a:latin typeface="Arial" charset="0"/>
-              <a:ea typeface="ヒラギノ角ゴ Pro W3" charset="-128"/>
-              <a:cs typeface="ヒラギノ角ゴ Pro W3" charset="-128"/>
-            </a:endParaRPr>
-          </a:p>
-        </p:txBody>
-      </p:sp>
-      <p:sp>
-        <p:nvSpPr>
-          <p:cNvPr id="8" name="TextBox 7">
-            <a:extLst>
-              <a:ext uri="{FF2B5EF4-FFF2-40B4-BE49-F238E27FC236}">
-                <a16:creationId xmlns:a16="http://schemas.microsoft.com/office/drawing/2014/main" id="{76C70CEE-667E-304D-5508-503AE4AE1C14}"/>
-              </a:ext>
-            </a:extLst>
-          </p:cNvPr>
-          <p:cNvSpPr txBox="1"/>
-          <p:nvPr/>
-        </p:nvSpPr>
-        <p:spPr>
-          <a:xfrm>
-            <a:off x="7656787" y="4325089"/>
-            <a:ext cx="590162" cy="369332"/>
-          </a:xfrm>
-          <a:prstGeom prst="rect">
-            <a:avLst/>
-          </a:prstGeom>
-          <a:noFill/>
-        </p:spPr>
-        <p:txBody>
-          <a:bodyPr wrap="none" rtlCol="0">
-            <a:spAutoFit/>
-          </a:bodyPr>
-          <a:lstStyle/>
-          <a:p>
-            <a:r>
-              <a:rPr lang="en-NO" dirty="0"/>
-              <a:t>FSM</a:t>
-            </a:r>
-          </a:p>
-        </p:txBody>
-      </p:sp>
-      <p:sp>
-        <p:nvSpPr>
-          <p:cNvPr id="9" name="TextBox 8">
-            <a:extLst>
-              <a:ext uri="{FF2B5EF4-FFF2-40B4-BE49-F238E27FC236}">
-                <a16:creationId xmlns:a16="http://schemas.microsoft.com/office/drawing/2014/main" id="{E37C9978-7C5F-EBC2-9E16-DA8F655EA4A4}"/>
-              </a:ext>
-            </a:extLst>
-          </p:cNvPr>
-          <p:cNvSpPr txBox="1"/>
-          <p:nvPr/>
-        </p:nvSpPr>
-        <p:spPr>
-          <a:xfrm>
-            <a:off x="1542944" y="4325089"/>
-            <a:ext cx="1872757" cy="369332"/>
-          </a:xfrm>
-          <a:prstGeom prst="rect">
-            <a:avLst/>
-          </a:prstGeom>
-          <a:noFill/>
-        </p:spPr>
-        <p:txBody>
-          <a:bodyPr wrap="none" rtlCol="0">
-            <a:spAutoFit/>
-          </a:bodyPr>
-          <a:lstStyle/>
-          <a:p>
-            <a:r>
-              <a:rPr lang="en-NO" dirty="0"/>
-              <a:t>Baud rate counter</a:t>
-            </a:r>
-          </a:p>
-        </p:txBody>
-      </p:sp>
-      <p:sp>
-        <p:nvSpPr>
-          <p:cNvPr id="10" name="TextBox 9">
-            <a:extLst>
-              <a:ext uri="{FF2B5EF4-FFF2-40B4-BE49-F238E27FC236}">
-                <a16:creationId xmlns:a16="http://schemas.microsoft.com/office/drawing/2014/main" id="{DD3C36D4-9BA7-468D-DA8C-128F31A9A6C5}"/>
-              </a:ext>
-            </a:extLst>
-          </p:cNvPr>
-          <p:cNvSpPr txBox="1"/>
-          <p:nvPr/>
-        </p:nvSpPr>
-        <p:spPr>
-          <a:xfrm>
-            <a:off x="1868481" y="1669634"/>
-            <a:ext cx="1221681" cy="369332"/>
-          </a:xfrm>
-          <a:prstGeom prst="rect">
-            <a:avLst/>
-          </a:prstGeom>
-          <a:noFill/>
-        </p:spPr>
-        <p:txBody>
-          <a:bodyPr wrap="none" rtlCol="0">
-            <a:spAutoFit/>
-          </a:bodyPr>
-          <a:lstStyle/>
-          <a:p>
-            <a:r>
-              <a:rPr lang="en-NO" dirty="0"/>
-              <a:t>Bit counter</a:t>
-            </a:r>
-          </a:p>
-        </p:txBody>
-      </p:sp>
-      <p:sp>
-        <p:nvSpPr>
-          <p:cNvPr id="11" name="TextBox 10">
-            <a:extLst>
-              <a:ext uri="{FF2B5EF4-FFF2-40B4-BE49-F238E27FC236}">
-                <a16:creationId xmlns:a16="http://schemas.microsoft.com/office/drawing/2014/main" id="{5A2BACB9-A382-1CF8-2CC2-44EB9A6FB9E7}"/>
-              </a:ext>
-            </a:extLst>
-          </p:cNvPr>
-          <p:cNvSpPr txBox="1"/>
-          <p:nvPr/>
-        </p:nvSpPr>
-        <p:spPr>
-          <a:xfrm>
-            <a:off x="7648868" y="1510206"/>
-            <a:ext cx="1377237" cy="369332"/>
-          </a:xfrm>
-          <a:prstGeom prst="rect">
-            <a:avLst/>
-          </a:prstGeom>
-          <a:noFill/>
-        </p:spPr>
-        <p:txBody>
-          <a:bodyPr wrap="none" rtlCol="0">
-            <a:spAutoFit/>
-          </a:bodyPr>
-          <a:lstStyle/>
-          <a:p>
-            <a:r>
-              <a:rPr lang="en-NO" dirty="0"/>
-              <a:t>Shift register</a:t>
-            </a:r>
-          </a:p>
-        </p:txBody>
-      </p:sp>
-      <p:cxnSp>
-        <p:nvCxnSpPr>
-          <p:cNvPr id="13" name="Straight Arrow Connector 12">
-            <a:extLst>
-              <a:ext uri="{FF2B5EF4-FFF2-40B4-BE49-F238E27FC236}">
-                <a16:creationId xmlns:a16="http://schemas.microsoft.com/office/drawing/2014/main" id="{99835C46-9ED6-6BA2-AF25-F85929CCDBC3}"/>
-              </a:ext>
-            </a:extLst>
-          </p:cNvPr>
-          <p:cNvCxnSpPr/>
-          <p:nvPr/>
-        </p:nvCxnSpPr>
-        <p:spPr>
-          <a:xfrm>
-            <a:off x="9476509" y="2281382"/>
-            <a:ext cx="914400" cy="914400"/>
-          </a:xfrm>
-          <a:prstGeom prst="straightConnector1">
-            <a:avLst/>
-          </a:prstGeom>
-          <a:ln>
-            <a:tailEnd type="triangle"/>
-          </a:ln>
-        </p:spPr>
-        <p:style>
-          <a:lnRef idx="1">
-            <a:schemeClr val="accent1"/>
-          </a:lnRef>
-          <a:fillRef idx="0">
-            <a:schemeClr val="accent1"/>
-          </a:fillRef>
-          <a:effectRef idx="0">
-            <a:schemeClr val="accent1"/>
-          </a:effectRef>
-          <a:fontRef idx="minor">
-            <a:schemeClr val="tx1"/>
-          </a:fontRef>
-        </p:style>
-      </p:cxnSp>
-    </p:spTree>
-    <p:extLst>
-      <p:ext uri="{BB962C8B-B14F-4D97-AF65-F5344CB8AC3E}">
-        <p14:creationId xmlns:p14="http://schemas.microsoft.com/office/powerpoint/2010/main" val="2855394394"/>
-      </p:ext>
-    </p:extLst>
-  </p:cSld>
-  <p:clrMapOvr>
-    <a:masterClrMapping/>
-  </p:clrMapOvr>
-  <p:timing>
-    <p:tnLst>
-      <p:par>
-        <p:cTn id="1" dur="indefinite" restart="never" nodeType="tmRoot">
-          <p:childTnLst>
-            <p:seq concurrent="1" nextAc="seek">
-              <p:cTn id="2" dur="indefinite" nodeType="mainSeq">
-                <p:childTnLst>
-                  <p:par>
-                    <p:cTn id="3" fill="hold">
-                      <p:stCondLst>
-                        <p:cond delay="indefinite"/>
-                      </p:stCondLst>
-                      <p:childTnLst>
-                        <p:par>
-                          <p:cTn id="4" fill="hold">
-                            <p:stCondLst>
-                              <p:cond delay="0"/>
-                            </p:stCondLst>
-                            <p:childTnLst>
-                              <p:par>
-                                <p:cTn id="5" presetID="1" presetClass="entr" presetSubtype="0" fill="hold" grpId="0" nodeType="clickEffect">
-                                  <p:stCondLst>
-                                    <p:cond delay="0"/>
-                                  </p:stCondLst>
-                                  <p:childTnLst>
-                                    <p:set>
-                                      <p:cBhvr>
-                                        <p:cTn id="6" dur="1" fill="hold">
-                                          <p:stCondLst>
-                                            <p:cond delay="0"/>
-                                          </p:stCondLst>
-                                        </p:cTn>
-                                        <p:tgtEl>
-                                          <p:spTgt spid="4"/>
-                                        </p:tgtEl>
-                                        <p:attrNameLst>
-                                          <p:attrName>style.visibility</p:attrName>
-                                        </p:attrNameLst>
-                                      </p:cBhvr>
-                                      <p:to>
-                                        <p:strVal val="visible"/>
-                                      </p:to>
-                                    </p:set>
-                                  </p:childTnLst>
-                                </p:cTn>
-                              </p:par>
-                            </p:childTnLst>
-                          </p:cTn>
-                        </p:par>
-                      </p:childTnLst>
-                    </p:cTn>
-                  </p:par>
-                  <p:par>
-                    <p:cTn id="7" fill="hold">
-                      <p:stCondLst>
-                        <p:cond delay="indefinite"/>
-                      </p:stCondLst>
-                      <p:childTnLst>
-                        <p:par>
-                          <p:cTn id="8" fill="hold">
-                            <p:stCondLst>
-                              <p:cond delay="0"/>
-                            </p:stCondLst>
-                            <p:childTnLst>
-                              <p:par>
-                                <p:cTn id="9" presetID="1" presetClass="entr" presetSubtype="0" fill="hold" grpId="0" nodeType="clickEffect">
-                                  <p:stCondLst>
-                                    <p:cond delay="0"/>
-                                  </p:stCondLst>
-                                  <p:childTnLst>
-                                    <p:set>
-                                      <p:cBhvr>
-                                        <p:cTn id="10" dur="1" fill="hold">
-                                          <p:stCondLst>
-                                            <p:cond delay="0"/>
-                                          </p:stCondLst>
-                                        </p:cTn>
-                                        <p:tgtEl>
-                                          <p:spTgt spid="5"/>
-                                        </p:tgtEl>
-                                        <p:attrNameLst>
-                                          <p:attrName>style.visibility</p:attrName>
-                                        </p:attrNameLst>
-                                      </p:cBhvr>
-                                      <p:to>
-                                        <p:strVal val="visible"/>
-                                      </p:to>
-                                    </p:set>
-                                  </p:childTnLst>
-                                </p:cTn>
-                              </p:par>
-                            </p:childTnLst>
-                          </p:cTn>
-                        </p:par>
-                      </p:childTnLst>
-                    </p:cTn>
-                  </p:par>
-                  <p:par>
-                    <p:cTn id="11" fill="hold">
-                      <p:stCondLst>
-                        <p:cond delay="indefinite"/>
-                      </p:stCondLst>
-                      <p:childTnLst>
-                        <p:par>
-                          <p:cTn id="12" fill="hold">
-                            <p:stCondLst>
-                              <p:cond delay="0"/>
-                            </p:stCondLst>
-                            <p:childTnLst>
-                              <p:par>
-                                <p:cTn id="13" presetID="1" presetClass="entr" presetSubtype="0" fill="hold" grpId="0" nodeType="clickEffect">
-                                  <p:stCondLst>
-                                    <p:cond delay="0"/>
-                                  </p:stCondLst>
-                                  <p:childTnLst>
-                                    <p:set>
-                                      <p:cBhvr>
-                                        <p:cTn id="14" dur="1" fill="hold">
-                                          <p:stCondLst>
-                                            <p:cond delay="0"/>
-                                          </p:stCondLst>
-                                        </p:cTn>
-                                        <p:tgtEl>
-                                          <p:spTgt spid="6"/>
-                                        </p:tgtEl>
-                                        <p:attrNameLst>
-                                          <p:attrName>style.visibility</p:attrName>
-                                        </p:attrNameLst>
-                                      </p:cBhvr>
-                                      <p:to>
-                                        <p:strVal val="visible"/>
-                                      </p:to>
-                                    </p:set>
-                                  </p:childTnLst>
-                                </p:cTn>
-                              </p:par>
-                            </p:childTnLst>
-                          </p:cTn>
-                        </p:par>
-                      </p:childTnLst>
-                    </p:cTn>
-                  </p:par>
-                  <p:par>
-                    <p:cTn id="15" fill="hold">
-                      <p:stCondLst>
-                        <p:cond delay="indefinite"/>
-                      </p:stCondLst>
-                      <p:childTnLst>
-                        <p:par>
-                          <p:cTn id="16" fill="hold">
-                            <p:stCondLst>
-                              <p:cond delay="0"/>
-                            </p:stCondLst>
-                            <p:childTnLst>
-                              <p:par>
-                                <p:cTn id="17" presetID="1" presetClass="entr" presetSubtype="0" fill="hold" grpId="0" nodeType="clickEffect">
-                                  <p:stCondLst>
-                                    <p:cond delay="0"/>
-                                  </p:stCondLst>
-                                  <p:childTnLst>
-                                    <p:set>
-                                      <p:cBhvr>
-                                        <p:cTn id="18" dur="1" fill="hold">
-                                          <p:stCondLst>
-                                            <p:cond delay="0"/>
-                                          </p:stCondLst>
-                                        </p:cTn>
-                                        <p:tgtEl>
-                                          <p:spTgt spid="7"/>
-                                        </p:tgtEl>
-                                        <p:attrNameLst>
-                                          <p:attrName>style.visibility</p:attrName>
-                                        </p:attrNameLst>
-                                      </p:cBhvr>
-                                      <p:to>
-                                        <p:strVal val="visible"/>
-                                      </p:to>
-                                    </p:set>
-                                  </p:childTnLst>
-                                </p:cTn>
-                              </p:par>
-                            </p:childTnLst>
-                          </p:cTn>
-                        </p:par>
-                      </p:childTnLst>
-                    </p:cTn>
-                  </p:par>
-                </p:childTnLst>
-              </p:cTn>
-              <p:prevCondLst>
-                <p:cond evt="onPrev" delay="0">
-                  <p:tgtEl>
-                    <p:sldTgt/>
-                  </p:tgtEl>
-                </p:cond>
-              </p:prevCondLst>
-              <p:nextCondLst>
-                <p:cond evt="onNext" delay="0">
-                  <p:tgtEl>
-                    <p:sldTgt/>
-                  </p:tgtEl>
-                </p:cond>
-              </p:nextCondLst>
-            </p:seq>
-          </p:childTnLst>
-        </p:cTn>
-      </p:par>
-    </p:tnLst>
-    <p:bldLst>
-      <p:bldP spid="4" grpId="0" animBg="1"/>
-      <p:bldP spid="5" grpId="0" animBg="1"/>
-      <p:bldP spid="6" grpId="0" animBg="1"/>
-      <p:bldP spid="7" grpId="0" animBg="1"/>
-    </p:bldLst>
-  </p:timing>
 </p:sld>
 </file>
 

</xml_diff>

<commit_message>
updated pptx with figures
</commit_message>
<xml_diff>
--- a/fys4220-jbook/images/vhdl_structure.pptx
+++ b/fys4220-jbook/images/vhdl_structure.pptx
@@ -5,7 +5,7 @@
     <p:sldMasterId id="2147483648" r:id="rId1"/>
   </p:sldMasterIdLst>
   <p:notesMasterIdLst>
-    <p:notesMasterId r:id="rId12"/>
+    <p:notesMasterId r:id="rId13"/>
   </p:notesMasterIdLst>
   <p:sldIdLst>
     <p:sldId id="256" r:id="rId2"/>
@@ -17,7 +17,8 @@
     <p:sldId id="259" r:id="rId8"/>
     <p:sldId id="260" r:id="rId9"/>
     <p:sldId id="391" r:id="rId10"/>
-    <p:sldId id="261" r:id="rId11"/>
+    <p:sldId id="392" r:id="rId11"/>
+    <p:sldId id="261" r:id="rId12"/>
   </p:sldIdLst>
   <p:sldSz cx="12192000" cy="6858000"/>
   <p:notesSz cx="6858000" cy="9144000"/>
@@ -792,6 +793,90 @@
             <a:fld id="{7ACF67FD-7740-1548-8966-E449BDC62186}" type="slidenum">
               <a:rPr lang="en-NO" smtClean="0"/>
               <a:t>10</a:t>
+            </a:fld>
+            <a:endParaRPr lang="en-NO"/>
+          </a:p>
+        </p:txBody>
+      </p:sp>
+    </p:spTree>
+    <p:extLst>
+      <p:ext uri="{BB962C8B-B14F-4D97-AF65-F5344CB8AC3E}">
+        <p14:creationId xmlns:p14="http://schemas.microsoft.com/office/powerpoint/2010/main" val="1840676067"/>
+      </p:ext>
+    </p:extLst>
+  </p:cSld>
+  <p:clrMapOvr>
+    <a:masterClrMapping/>
+  </p:clrMapOvr>
+</p:notes>
+</file>
+
+<file path=ppt/notesSlides/notesSlide5.xml><?xml version="1.0" encoding="utf-8"?>
+<p:notes xmlns:a="http://schemas.openxmlformats.org/drawingml/2006/main" xmlns:r="http://schemas.openxmlformats.org/officeDocument/2006/relationships" xmlns:p="http://schemas.openxmlformats.org/presentationml/2006/main">
+  <p:cSld>
+    <p:spTree>
+      <p:nvGrpSpPr>
+        <p:cNvPr id="1" name=""/>
+        <p:cNvGrpSpPr/>
+        <p:nvPr/>
+      </p:nvGrpSpPr>
+      <p:grpSpPr>
+        <a:xfrm>
+          <a:off x="0" y="0"/>
+          <a:ext cx="0" cy="0"/>
+          <a:chOff x="0" y="0"/>
+          <a:chExt cx="0" cy="0"/>
+        </a:xfrm>
+      </p:grpSpPr>
+      <p:sp>
+        <p:nvSpPr>
+          <p:cNvPr id="2" name="Slide Image Placeholder 1"/>
+          <p:cNvSpPr>
+            <a:spLocks noGrp="1" noRot="1" noChangeAspect="1"/>
+          </p:cNvSpPr>
+          <p:nvPr>
+            <p:ph type="sldImg"/>
+          </p:nvPr>
+        </p:nvSpPr>
+        <p:spPr/>
+      </p:sp>
+      <p:sp>
+        <p:nvSpPr>
+          <p:cNvPr id="3" name="Notes Placeholder 2"/>
+          <p:cNvSpPr>
+            <a:spLocks noGrp="1"/>
+          </p:cNvSpPr>
+          <p:nvPr>
+            <p:ph type="body" idx="1"/>
+          </p:nvPr>
+        </p:nvSpPr>
+        <p:spPr/>
+        <p:txBody>
+          <a:bodyPr/>
+          <a:lstStyle/>
+          <a:p>
+            <a:endParaRPr lang="en-NO" dirty="0"/>
+          </a:p>
+        </p:txBody>
+      </p:sp>
+      <p:sp>
+        <p:nvSpPr>
+          <p:cNvPr id="4" name="Slide Number Placeholder 3"/>
+          <p:cNvSpPr>
+            <a:spLocks noGrp="1"/>
+          </p:cNvSpPr>
+          <p:nvPr>
+            <p:ph type="sldNum" sz="quarter" idx="5"/>
+          </p:nvPr>
+        </p:nvSpPr>
+        <p:spPr/>
+        <p:txBody>
+          <a:bodyPr/>
+          <a:lstStyle/>
+          <a:p>
+            <a:fld id="{7ACF67FD-7740-1548-8966-E449BDC62186}" type="slidenum">
+              <a:rPr lang="en-NO" smtClean="0"/>
+              <a:t>11</a:t>
             </a:fld>
             <a:endParaRPr lang="en-NO"/>
           </a:p>
@@ -4708,6 +4793,3174 @@
 </file>
 
 <file path=ppt/slides/slide10.xml><?xml version="1.0" encoding="utf-8"?>
+<p:sld xmlns:a="http://schemas.openxmlformats.org/drawingml/2006/main" xmlns:r="http://schemas.openxmlformats.org/officeDocument/2006/relationships" xmlns:p="http://schemas.openxmlformats.org/presentationml/2006/main">
+  <p:cSld>
+    <p:spTree>
+      <p:nvGrpSpPr>
+        <p:cNvPr id="1" name=""/>
+        <p:cNvGrpSpPr/>
+        <p:nvPr/>
+      </p:nvGrpSpPr>
+      <p:grpSpPr>
+        <a:xfrm>
+          <a:off x="0" y="0"/>
+          <a:ext cx="0" cy="0"/>
+          <a:chOff x="0" y="0"/>
+          <a:chExt cx="0" cy="0"/>
+        </a:xfrm>
+      </p:grpSpPr>
+      <p:sp>
+        <p:nvSpPr>
+          <p:cNvPr id="4" name="Rectangle 3">
+            <a:extLst>
+              <a:ext uri="{FF2B5EF4-FFF2-40B4-BE49-F238E27FC236}">
+                <a16:creationId xmlns:a16="http://schemas.microsoft.com/office/drawing/2014/main" id="{F22CAEBE-5D6E-CCED-CF14-1DF6D7B3B471}"/>
+              </a:ext>
+            </a:extLst>
+          </p:cNvPr>
+          <p:cNvSpPr/>
+          <p:nvPr/>
+        </p:nvSpPr>
+        <p:spPr bwMode="auto">
+          <a:xfrm>
+            <a:off x="6944524" y="3233365"/>
+            <a:ext cx="720080" cy="1224136"/>
+          </a:xfrm>
+          <a:prstGeom prst="rect">
+            <a:avLst/>
+          </a:prstGeom>
+          <a:solidFill>
+            <a:schemeClr val="bg2">
+              <a:lumMod val="20000"/>
+              <a:lumOff val="80000"/>
+            </a:schemeClr>
+          </a:solidFill>
+          <a:ln w="25400" cap="flat" cmpd="sng" algn="ctr">
+            <a:solidFill>
+              <a:schemeClr val="tx1"/>
+            </a:solidFill>
+            <a:prstDash val="solid"/>
+            <a:round/>
+            <a:headEnd type="none" w="med" len="med"/>
+            <a:tailEnd type="none" w="med" len="med"/>
+          </a:ln>
+          <a:effectLst/>
+        </p:spPr>
+        <p:txBody>
+          <a:bodyPr vert="horz" wrap="square" lIns="91440" tIns="45720" rIns="91440" bIns="45720" numCol="1" rtlCol="0" anchor="t" anchorCtr="0" compatLnSpc="1">
+            <a:prstTxWarp prst="textNoShape">
+              <a:avLst/>
+            </a:prstTxWarp>
+          </a:bodyPr>
+          <a:lstStyle/>
+          <a:p>
+            <a:pPr defTabSz="914400" eaLnBrk="0" fontAlgn="base" hangingPunct="0">
+              <a:spcBef>
+                <a:spcPct val="0"/>
+              </a:spcBef>
+              <a:spcAft>
+                <a:spcPct val="0"/>
+              </a:spcAft>
+            </a:pPr>
+            <a:endParaRPr lang="en-US" sz="2000" dirty="0">
+              <a:latin typeface="Arial" charset="0"/>
+              <a:ea typeface="ヒラギノ角ゴ Pro W3" charset="-128"/>
+              <a:cs typeface="ヒラギノ角ゴ Pro W3" charset="-128"/>
+            </a:endParaRPr>
+          </a:p>
+        </p:txBody>
+      </p:sp>
+      <p:sp>
+        <p:nvSpPr>
+          <p:cNvPr id="5" name="TextBox 4">
+            <a:extLst>
+              <a:ext uri="{FF2B5EF4-FFF2-40B4-BE49-F238E27FC236}">
+                <a16:creationId xmlns:a16="http://schemas.microsoft.com/office/drawing/2014/main" id="{5F1ED6EB-C11F-F5F8-5EEF-587B8C7202D8}"/>
+              </a:ext>
+            </a:extLst>
+          </p:cNvPr>
+          <p:cNvSpPr txBox="1"/>
+          <p:nvPr/>
+        </p:nvSpPr>
+        <p:spPr>
+          <a:xfrm>
+            <a:off x="7333115" y="3377381"/>
+            <a:ext cx="340158" cy="369332"/>
+          </a:xfrm>
+          <a:prstGeom prst="rect">
+            <a:avLst/>
+          </a:prstGeom>
+          <a:noFill/>
+        </p:spPr>
+        <p:txBody>
+          <a:bodyPr wrap="square" rtlCol="0">
+            <a:spAutoFit/>
+          </a:bodyPr>
+          <a:lstStyle/>
+          <a:p>
+            <a:r>
+              <a:rPr lang="en-US" dirty="0"/>
+              <a:t>Q</a:t>
+            </a:r>
+          </a:p>
+        </p:txBody>
+      </p:sp>
+      <p:sp>
+        <p:nvSpPr>
+          <p:cNvPr id="6" name="TextBox 5">
+            <a:extLst>
+              <a:ext uri="{FF2B5EF4-FFF2-40B4-BE49-F238E27FC236}">
+                <a16:creationId xmlns:a16="http://schemas.microsoft.com/office/drawing/2014/main" id="{F14A2F8D-9546-4C82-DC45-79CEEF5D5EF3}"/>
+              </a:ext>
+            </a:extLst>
+          </p:cNvPr>
+          <p:cNvSpPr txBox="1"/>
+          <p:nvPr/>
+        </p:nvSpPr>
+        <p:spPr>
+          <a:xfrm>
+            <a:off x="7048223" y="3731603"/>
+            <a:ext cx="439544" cy="369332"/>
+          </a:xfrm>
+          <a:prstGeom prst="rect">
+            <a:avLst/>
+          </a:prstGeom>
+          <a:noFill/>
+        </p:spPr>
+        <p:txBody>
+          <a:bodyPr wrap="square" rtlCol="0">
+            <a:spAutoFit/>
+          </a:bodyPr>
+          <a:lstStyle/>
+          <a:p>
+            <a:r>
+              <a:rPr lang="en-US" dirty="0"/>
+              <a:t>clk</a:t>
+            </a:r>
+          </a:p>
+        </p:txBody>
+      </p:sp>
+      <p:sp>
+        <p:nvSpPr>
+          <p:cNvPr id="7" name="TextBox 6">
+            <a:extLst>
+              <a:ext uri="{FF2B5EF4-FFF2-40B4-BE49-F238E27FC236}">
+                <a16:creationId xmlns:a16="http://schemas.microsoft.com/office/drawing/2014/main" id="{DC21D59F-0669-ED23-60F0-CAC50C2E3510}"/>
+              </a:ext>
+            </a:extLst>
+          </p:cNvPr>
+          <p:cNvSpPr txBox="1"/>
+          <p:nvPr/>
+        </p:nvSpPr>
+        <p:spPr>
+          <a:xfrm>
+            <a:off x="6944524" y="3377381"/>
+            <a:ext cx="327334" cy="369332"/>
+          </a:xfrm>
+          <a:prstGeom prst="rect">
+            <a:avLst/>
+          </a:prstGeom>
+          <a:noFill/>
+        </p:spPr>
+        <p:txBody>
+          <a:bodyPr wrap="square" rtlCol="0">
+            <a:spAutoFit/>
+          </a:bodyPr>
+          <a:lstStyle/>
+          <a:p>
+            <a:r>
+              <a:rPr lang="en-US" dirty="0"/>
+              <a:t>D</a:t>
+            </a:r>
+          </a:p>
+        </p:txBody>
+      </p:sp>
+      <p:sp>
+        <p:nvSpPr>
+          <p:cNvPr id="8" name="Triangle 7">
+            <a:extLst>
+              <a:ext uri="{FF2B5EF4-FFF2-40B4-BE49-F238E27FC236}">
+                <a16:creationId xmlns:a16="http://schemas.microsoft.com/office/drawing/2014/main" id="{9FAA9CA8-A09A-00F0-9BFA-90BA0ED4D37E}"/>
+              </a:ext>
+            </a:extLst>
+          </p:cNvPr>
+          <p:cNvSpPr/>
+          <p:nvPr/>
+        </p:nvSpPr>
+        <p:spPr bwMode="auto">
+          <a:xfrm rot="5400000">
+            <a:off x="6910126" y="3828069"/>
+            <a:ext cx="214418" cy="145622"/>
+          </a:xfrm>
+          <a:prstGeom prst="triangle">
+            <a:avLst/>
+          </a:prstGeom>
+          <a:noFill/>
+          <a:ln w="12700" cap="flat" cmpd="sng" algn="ctr">
+            <a:solidFill>
+              <a:schemeClr val="tx1"/>
+            </a:solidFill>
+            <a:prstDash val="solid"/>
+            <a:round/>
+            <a:headEnd type="none" w="med" len="med"/>
+            <a:tailEnd type="none" w="med" len="med"/>
+          </a:ln>
+          <a:effectLst/>
+        </p:spPr>
+        <p:txBody>
+          <a:bodyPr vert="horz" wrap="square" lIns="91440" tIns="45720" rIns="91440" bIns="45720" numCol="1" rtlCol="0" anchor="t" anchorCtr="0" compatLnSpc="1">
+            <a:prstTxWarp prst="textNoShape">
+              <a:avLst/>
+            </a:prstTxWarp>
+          </a:bodyPr>
+          <a:lstStyle/>
+          <a:p>
+            <a:pPr defTabSz="914400" eaLnBrk="0" fontAlgn="base" hangingPunct="0">
+              <a:spcBef>
+                <a:spcPct val="0"/>
+              </a:spcBef>
+              <a:spcAft>
+                <a:spcPct val="0"/>
+              </a:spcAft>
+            </a:pPr>
+            <a:endParaRPr lang="en-US" sz="2000" dirty="0">
+              <a:latin typeface="Arial" charset="0"/>
+              <a:ea typeface="ヒラギノ角ゴ Pro W3" charset="-128"/>
+              <a:cs typeface="ヒラギノ角ゴ Pro W3" charset="-128"/>
+            </a:endParaRPr>
+          </a:p>
+        </p:txBody>
+      </p:sp>
+      <p:cxnSp>
+        <p:nvCxnSpPr>
+          <p:cNvPr id="9" name="Straight Connector 8">
+            <a:extLst>
+              <a:ext uri="{FF2B5EF4-FFF2-40B4-BE49-F238E27FC236}">
+                <a16:creationId xmlns:a16="http://schemas.microsoft.com/office/drawing/2014/main" id="{3E18773F-ECC1-B9C4-F58D-62962C3955C7}"/>
+              </a:ext>
+            </a:extLst>
+          </p:cNvPr>
+          <p:cNvCxnSpPr>
+            <a:cxnSpLocks/>
+            <a:stCxn id="3" idx="3"/>
+            <a:endCxn id="7" idx="1"/>
+          </p:cNvCxnSpPr>
+          <p:nvPr/>
+        </p:nvCxnSpPr>
+        <p:spPr bwMode="auto">
+          <a:xfrm>
+            <a:off x="5206683" y="3561064"/>
+            <a:ext cx="1737841" cy="983"/>
+          </a:xfrm>
+          <a:prstGeom prst="line">
+            <a:avLst/>
+          </a:prstGeom>
+          <a:solidFill>
+            <a:schemeClr val="accent1"/>
+          </a:solidFill>
+          <a:ln w="25400" cap="flat" cmpd="sng" algn="ctr">
+            <a:solidFill>
+              <a:schemeClr val="tx1"/>
+            </a:solidFill>
+            <a:prstDash val="solid"/>
+            <a:round/>
+            <a:headEnd type="none" w="med" len="med"/>
+            <a:tailEnd type="none" w="med" len="med"/>
+          </a:ln>
+          <a:effectLst/>
+        </p:spPr>
+      </p:cxnSp>
+      <p:cxnSp>
+        <p:nvCxnSpPr>
+          <p:cNvPr id="11" name="Straight Connector 10">
+            <a:extLst>
+              <a:ext uri="{FF2B5EF4-FFF2-40B4-BE49-F238E27FC236}">
+                <a16:creationId xmlns:a16="http://schemas.microsoft.com/office/drawing/2014/main" id="{659020FF-1CC9-53B5-E361-0C380A2ACF52}"/>
+              </a:ext>
+            </a:extLst>
+          </p:cNvPr>
+          <p:cNvCxnSpPr>
+            <a:cxnSpLocks/>
+            <a:endCxn id="8" idx="3"/>
+          </p:cNvCxnSpPr>
+          <p:nvPr/>
+        </p:nvCxnSpPr>
+        <p:spPr bwMode="auto">
+          <a:xfrm>
+            <a:off x="6395080" y="3900880"/>
+            <a:ext cx="549444" cy="0"/>
+          </a:xfrm>
+          <a:prstGeom prst="line">
+            <a:avLst/>
+          </a:prstGeom>
+          <a:solidFill>
+            <a:schemeClr val="accent1"/>
+          </a:solidFill>
+          <a:ln w="25400" cap="flat" cmpd="sng" algn="ctr">
+            <a:solidFill>
+              <a:schemeClr val="tx1"/>
+            </a:solidFill>
+            <a:prstDash val="solid"/>
+            <a:round/>
+            <a:headEnd type="none" w="med" len="med"/>
+            <a:tailEnd type="none" w="med" len="med"/>
+          </a:ln>
+          <a:effectLst/>
+        </p:spPr>
+      </p:cxnSp>
+      <p:cxnSp>
+        <p:nvCxnSpPr>
+          <p:cNvPr id="17" name="Straight Connector 16">
+            <a:extLst>
+              <a:ext uri="{FF2B5EF4-FFF2-40B4-BE49-F238E27FC236}">
+                <a16:creationId xmlns:a16="http://schemas.microsoft.com/office/drawing/2014/main" id="{86F9A486-CB8B-59BE-97A9-33F3CE0F3100}"/>
+              </a:ext>
+            </a:extLst>
+          </p:cNvPr>
+          <p:cNvCxnSpPr>
+            <a:cxnSpLocks/>
+          </p:cNvCxnSpPr>
+          <p:nvPr/>
+        </p:nvCxnSpPr>
+        <p:spPr bwMode="auto">
+          <a:xfrm>
+            <a:off x="6711624" y="2836951"/>
+            <a:ext cx="0" cy="717601"/>
+          </a:xfrm>
+          <a:prstGeom prst="line">
+            <a:avLst/>
+          </a:prstGeom>
+          <a:solidFill>
+            <a:schemeClr val="accent1"/>
+          </a:solidFill>
+          <a:ln w="28575" cap="flat" cmpd="sng" algn="ctr">
+            <a:solidFill>
+              <a:schemeClr val="tx1"/>
+            </a:solidFill>
+            <a:prstDash val="solid"/>
+            <a:round/>
+            <a:headEnd type="none" w="med" len="med"/>
+            <a:tailEnd type="none" w="med" len="med"/>
+          </a:ln>
+          <a:effectLst/>
+        </p:spPr>
+      </p:cxnSp>
+      <p:sp>
+        <p:nvSpPr>
+          <p:cNvPr id="20" name="Delay 19">
+            <a:extLst>
+              <a:ext uri="{FF2B5EF4-FFF2-40B4-BE49-F238E27FC236}">
+                <a16:creationId xmlns:a16="http://schemas.microsoft.com/office/drawing/2014/main" id="{A33106AF-12FE-7EFE-D40A-BDC95D25D8D4}"/>
+              </a:ext>
+            </a:extLst>
+          </p:cNvPr>
+          <p:cNvSpPr/>
+          <p:nvPr/>
+        </p:nvSpPr>
+        <p:spPr>
+          <a:xfrm>
+            <a:off x="8600708" y="2647905"/>
+            <a:ext cx="636759" cy="660411"/>
+          </a:xfrm>
+          <a:prstGeom prst="flowChartDelay">
+            <a:avLst/>
+          </a:prstGeom>
+          <a:solidFill>
+            <a:schemeClr val="bg1"/>
+          </a:solidFill>
+          <a:ln w="25400">
+            <a:solidFill>
+              <a:schemeClr val="tx1"/>
+            </a:solidFill>
+          </a:ln>
+        </p:spPr>
+        <p:style>
+          <a:lnRef idx="2">
+            <a:schemeClr val="accent1">
+              <a:shade val="50000"/>
+            </a:schemeClr>
+          </a:lnRef>
+          <a:fillRef idx="1">
+            <a:schemeClr val="accent1"/>
+          </a:fillRef>
+          <a:effectRef idx="0">
+            <a:schemeClr val="accent1"/>
+          </a:effectRef>
+          <a:fontRef idx="minor">
+            <a:schemeClr val="lt1"/>
+          </a:fontRef>
+        </p:style>
+        <p:txBody>
+          <a:bodyPr rtlCol="0" anchor="ctr"/>
+          <a:lstStyle/>
+          <a:p>
+            <a:pPr algn="ctr"/>
+            <a:endParaRPr lang="en-NO"/>
+          </a:p>
+        </p:txBody>
+      </p:sp>
+      <p:cxnSp>
+        <p:nvCxnSpPr>
+          <p:cNvPr id="23" name="Elbow Connector 22">
+            <a:extLst>
+              <a:ext uri="{FF2B5EF4-FFF2-40B4-BE49-F238E27FC236}">
+                <a16:creationId xmlns:a16="http://schemas.microsoft.com/office/drawing/2014/main" id="{2DD2C7F3-8660-FF6B-F38C-E8805C771BFE}"/>
+              </a:ext>
+            </a:extLst>
+          </p:cNvPr>
+          <p:cNvCxnSpPr>
+            <a:cxnSpLocks/>
+            <a:stCxn id="5" idx="3"/>
+          </p:cNvCxnSpPr>
+          <p:nvPr/>
+        </p:nvCxnSpPr>
+        <p:spPr>
+          <a:xfrm flipV="1">
+            <a:off x="7673273" y="3122269"/>
+            <a:ext cx="927435" cy="439778"/>
+          </a:xfrm>
+          <a:prstGeom prst="bentConnector3">
+            <a:avLst/>
+          </a:prstGeom>
+          <a:ln w="25400">
+            <a:solidFill>
+              <a:schemeClr val="tx1"/>
+            </a:solidFill>
+          </a:ln>
+        </p:spPr>
+        <p:style>
+          <a:lnRef idx="1">
+            <a:schemeClr val="accent1"/>
+          </a:lnRef>
+          <a:fillRef idx="0">
+            <a:schemeClr val="accent1"/>
+          </a:fillRef>
+          <a:effectRef idx="0">
+            <a:schemeClr val="accent1"/>
+          </a:effectRef>
+          <a:fontRef idx="minor">
+            <a:schemeClr val="tx1"/>
+          </a:fontRef>
+        </p:style>
+      </p:cxnSp>
+      <p:sp>
+        <p:nvSpPr>
+          <p:cNvPr id="29" name="Triangle 28">
+            <a:extLst>
+              <a:ext uri="{FF2B5EF4-FFF2-40B4-BE49-F238E27FC236}">
+                <a16:creationId xmlns:a16="http://schemas.microsoft.com/office/drawing/2014/main" id="{1E044AE7-B904-FA01-8AE1-6C6268DCE446}"/>
+              </a:ext>
+            </a:extLst>
+          </p:cNvPr>
+          <p:cNvSpPr/>
+          <p:nvPr/>
+        </p:nvSpPr>
+        <p:spPr>
+          <a:xfrm rot="5400000">
+            <a:off x="7713139" y="2641158"/>
+            <a:ext cx="462197" cy="391587"/>
+          </a:xfrm>
+          <a:prstGeom prst="triangle">
+            <a:avLst/>
+          </a:prstGeom>
+          <a:solidFill>
+            <a:schemeClr val="bg1"/>
+          </a:solidFill>
+          <a:ln w="25400">
+            <a:solidFill>
+              <a:schemeClr val="tx1"/>
+            </a:solidFill>
+          </a:ln>
+        </p:spPr>
+        <p:style>
+          <a:lnRef idx="2">
+            <a:schemeClr val="accent1">
+              <a:shade val="50000"/>
+            </a:schemeClr>
+          </a:lnRef>
+          <a:fillRef idx="1">
+            <a:schemeClr val="accent1"/>
+          </a:fillRef>
+          <a:effectRef idx="0">
+            <a:schemeClr val="accent1"/>
+          </a:effectRef>
+          <a:fontRef idx="minor">
+            <a:schemeClr val="lt1"/>
+          </a:fontRef>
+        </p:style>
+        <p:txBody>
+          <a:bodyPr rtlCol="0" anchor="ctr"/>
+          <a:lstStyle/>
+          <a:p>
+            <a:pPr algn="ctr"/>
+            <a:endParaRPr lang="en-NO"/>
+          </a:p>
+        </p:txBody>
+      </p:sp>
+      <p:cxnSp>
+        <p:nvCxnSpPr>
+          <p:cNvPr id="30" name="Straight Connector 29">
+            <a:extLst>
+              <a:ext uri="{FF2B5EF4-FFF2-40B4-BE49-F238E27FC236}">
+                <a16:creationId xmlns:a16="http://schemas.microsoft.com/office/drawing/2014/main" id="{AC7458AC-1F94-54F6-5146-035BA6339798}"/>
+              </a:ext>
+            </a:extLst>
+          </p:cNvPr>
+          <p:cNvCxnSpPr>
+            <a:cxnSpLocks/>
+          </p:cNvCxnSpPr>
+          <p:nvPr/>
+        </p:nvCxnSpPr>
+        <p:spPr bwMode="auto">
+          <a:xfrm>
+            <a:off x="6696634" y="2836951"/>
+            <a:ext cx="1051810" cy="0"/>
+          </a:xfrm>
+          <a:prstGeom prst="line">
+            <a:avLst/>
+          </a:prstGeom>
+          <a:solidFill>
+            <a:schemeClr val="accent1"/>
+          </a:solidFill>
+          <a:ln w="25400" cap="flat" cmpd="sng" algn="ctr">
+            <a:solidFill>
+              <a:schemeClr val="tx1"/>
+            </a:solidFill>
+            <a:prstDash val="solid"/>
+            <a:round/>
+            <a:headEnd type="none" w="med" len="med"/>
+            <a:tailEnd type="none" w="med" len="med"/>
+          </a:ln>
+          <a:effectLst/>
+        </p:spPr>
+      </p:cxnSp>
+      <p:sp>
+        <p:nvSpPr>
+          <p:cNvPr id="34" name="Oval 33">
+            <a:extLst>
+              <a:ext uri="{FF2B5EF4-FFF2-40B4-BE49-F238E27FC236}">
+                <a16:creationId xmlns:a16="http://schemas.microsoft.com/office/drawing/2014/main" id="{54271E4D-6C83-9C37-8182-08288778A0E1}"/>
+              </a:ext>
+            </a:extLst>
+          </p:cNvPr>
+          <p:cNvSpPr/>
+          <p:nvPr/>
+        </p:nvSpPr>
+        <p:spPr>
+          <a:xfrm>
+            <a:off x="8136990" y="2791981"/>
+            <a:ext cx="88641" cy="95766"/>
+          </a:xfrm>
+          <a:prstGeom prst="ellipse">
+            <a:avLst/>
+          </a:prstGeom>
+          <a:solidFill>
+            <a:schemeClr val="bg1"/>
+          </a:solidFill>
+          <a:ln w="25400">
+            <a:solidFill>
+              <a:schemeClr val="tx1"/>
+            </a:solidFill>
+          </a:ln>
+        </p:spPr>
+        <p:style>
+          <a:lnRef idx="2">
+            <a:schemeClr val="accent1">
+              <a:shade val="50000"/>
+            </a:schemeClr>
+          </a:lnRef>
+          <a:fillRef idx="1">
+            <a:schemeClr val="accent1"/>
+          </a:fillRef>
+          <a:effectRef idx="0">
+            <a:schemeClr val="accent1"/>
+          </a:effectRef>
+          <a:fontRef idx="minor">
+            <a:schemeClr val="lt1"/>
+          </a:fontRef>
+        </p:style>
+        <p:txBody>
+          <a:bodyPr rtlCol="0" anchor="ctr"/>
+          <a:lstStyle/>
+          <a:p>
+            <a:pPr algn="ctr"/>
+            <a:endParaRPr lang="en-NO"/>
+          </a:p>
+        </p:txBody>
+      </p:sp>
+      <p:cxnSp>
+        <p:nvCxnSpPr>
+          <p:cNvPr id="35" name="Straight Connector 34">
+            <a:extLst>
+              <a:ext uri="{FF2B5EF4-FFF2-40B4-BE49-F238E27FC236}">
+                <a16:creationId xmlns:a16="http://schemas.microsoft.com/office/drawing/2014/main" id="{B106F535-423C-045A-B939-D951B89358C3}"/>
+              </a:ext>
+            </a:extLst>
+          </p:cNvPr>
+          <p:cNvCxnSpPr>
+            <a:cxnSpLocks/>
+          </p:cNvCxnSpPr>
+          <p:nvPr/>
+        </p:nvCxnSpPr>
+        <p:spPr bwMode="auto">
+          <a:xfrm>
+            <a:off x="8225631" y="2836951"/>
+            <a:ext cx="375077" cy="0"/>
+          </a:xfrm>
+          <a:prstGeom prst="line">
+            <a:avLst/>
+          </a:prstGeom>
+          <a:solidFill>
+            <a:schemeClr val="accent1"/>
+          </a:solidFill>
+          <a:ln w="25400" cap="flat" cmpd="sng" algn="ctr">
+            <a:solidFill>
+              <a:schemeClr val="tx1"/>
+            </a:solidFill>
+            <a:prstDash val="solid"/>
+            <a:round/>
+            <a:headEnd type="none" w="med" len="med"/>
+            <a:tailEnd type="none" w="med" len="med"/>
+          </a:ln>
+          <a:effectLst/>
+        </p:spPr>
+      </p:cxnSp>
+      <p:cxnSp>
+        <p:nvCxnSpPr>
+          <p:cNvPr id="38" name="Straight Connector 37">
+            <a:extLst>
+              <a:ext uri="{FF2B5EF4-FFF2-40B4-BE49-F238E27FC236}">
+                <a16:creationId xmlns:a16="http://schemas.microsoft.com/office/drawing/2014/main" id="{41DDEF58-7527-5895-9EFD-52F859188705}"/>
+              </a:ext>
+            </a:extLst>
+          </p:cNvPr>
+          <p:cNvCxnSpPr>
+            <a:cxnSpLocks/>
+          </p:cNvCxnSpPr>
+          <p:nvPr/>
+        </p:nvCxnSpPr>
+        <p:spPr bwMode="auto">
+          <a:xfrm>
+            <a:off x="9237467" y="2974783"/>
+            <a:ext cx="375077" cy="0"/>
+          </a:xfrm>
+          <a:prstGeom prst="line">
+            <a:avLst/>
+          </a:prstGeom>
+          <a:solidFill>
+            <a:schemeClr val="accent1"/>
+          </a:solidFill>
+          <a:ln w="25400" cap="flat" cmpd="sng" algn="ctr">
+            <a:solidFill>
+              <a:schemeClr val="tx1"/>
+            </a:solidFill>
+            <a:prstDash val="solid"/>
+            <a:round/>
+            <a:headEnd type="none" w="med" len="med"/>
+            <a:tailEnd type="none" w="med" len="med"/>
+          </a:ln>
+          <a:effectLst/>
+        </p:spPr>
+      </p:cxnSp>
+      <p:sp>
+        <p:nvSpPr>
+          <p:cNvPr id="39" name="TextBox 38">
+            <a:extLst>
+              <a:ext uri="{FF2B5EF4-FFF2-40B4-BE49-F238E27FC236}">
+                <a16:creationId xmlns:a16="http://schemas.microsoft.com/office/drawing/2014/main" id="{54707519-6A3C-F991-53A7-2A2D457A28A8}"/>
+              </a:ext>
+            </a:extLst>
+          </p:cNvPr>
+          <p:cNvSpPr txBox="1"/>
+          <p:nvPr/>
+        </p:nvSpPr>
+        <p:spPr>
+          <a:xfrm>
+            <a:off x="10368711" y="2598772"/>
+            <a:ext cx="686406" cy="369332"/>
+          </a:xfrm>
+          <a:prstGeom prst="rect">
+            <a:avLst/>
+          </a:prstGeom>
+          <a:noFill/>
+        </p:spPr>
+        <p:txBody>
+          <a:bodyPr wrap="none" rtlCol="0">
+            <a:spAutoFit/>
+          </a:bodyPr>
+          <a:lstStyle/>
+          <a:p>
+            <a:r>
+              <a:rPr lang="en-NO" dirty="0"/>
+              <a:t>pulse</a:t>
+            </a:r>
+          </a:p>
+        </p:txBody>
+      </p:sp>
+      <p:sp>
+        <p:nvSpPr>
+          <p:cNvPr id="40" name="TextBox 39">
+            <a:extLst>
+              <a:ext uri="{FF2B5EF4-FFF2-40B4-BE49-F238E27FC236}">
+                <a16:creationId xmlns:a16="http://schemas.microsoft.com/office/drawing/2014/main" id="{6C527322-442F-77E3-E3D1-72F13DEF8206}"/>
+              </a:ext>
+            </a:extLst>
+          </p:cNvPr>
+          <p:cNvSpPr txBox="1"/>
+          <p:nvPr/>
+        </p:nvSpPr>
+        <p:spPr>
+          <a:xfrm>
+            <a:off x="7813088" y="3531548"/>
+            <a:ext cx="1228221" cy="369332"/>
+          </a:xfrm>
+          <a:prstGeom prst="rect">
+            <a:avLst/>
+          </a:prstGeom>
+          <a:noFill/>
+        </p:spPr>
+        <p:txBody>
+          <a:bodyPr wrap="none" rtlCol="0">
+            <a:spAutoFit/>
+          </a:bodyPr>
+          <a:lstStyle/>
+          <a:p>
+            <a:r>
+              <a:rPr lang="en-GB" dirty="0"/>
+              <a:t>e</a:t>
+            </a:r>
+            <a:r>
+              <a:rPr lang="en-NO" dirty="0"/>
+              <a:t>nable_i_n</a:t>
+            </a:r>
+          </a:p>
+        </p:txBody>
+      </p:sp>
+      <p:sp>
+        <p:nvSpPr>
+          <p:cNvPr id="41" name="TextBox 40">
+            <a:extLst>
+              <a:ext uri="{FF2B5EF4-FFF2-40B4-BE49-F238E27FC236}">
+                <a16:creationId xmlns:a16="http://schemas.microsoft.com/office/drawing/2014/main" id="{E219D120-731A-1CEA-1EC6-374A58ECD518}"/>
+              </a:ext>
+            </a:extLst>
+          </p:cNvPr>
+          <p:cNvSpPr txBox="1"/>
+          <p:nvPr/>
+        </p:nvSpPr>
+        <p:spPr>
+          <a:xfrm>
+            <a:off x="662709" y="3371279"/>
+            <a:ext cx="1059906" cy="369332"/>
+          </a:xfrm>
+          <a:prstGeom prst="rect">
+            <a:avLst/>
+          </a:prstGeom>
+          <a:noFill/>
+        </p:spPr>
+        <p:txBody>
+          <a:bodyPr wrap="none" rtlCol="0">
+            <a:spAutoFit/>
+          </a:bodyPr>
+          <a:lstStyle/>
+          <a:p>
+            <a:r>
+              <a:rPr lang="en-GB" dirty="0"/>
+              <a:t>e</a:t>
+            </a:r>
+            <a:r>
+              <a:rPr lang="en-NO" dirty="0"/>
+              <a:t>nable_n</a:t>
+            </a:r>
+          </a:p>
+        </p:txBody>
+      </p:sp>
+      <p:sp>
+        <p:nvSpPr>
+          <p:cNvPr id="2" name="Rectangle 1">
+            <a:extLst>
+              <a:ext uri="{FF2B5EF4-FFF2-40B4-BE49-F238E27FC236}">
+                <a16:creationId xmlns:a16="http://schemas.microsoft.com/office/drawing/2014/main" id="{C0068162-EE0C-44F2-FD53-53655CD68E2D}"/>
+              </a:ext>
+            </a:extLst>
+          </p:cNvPr>
+          <p:cNvSpPr/>
+          <p:nvPr/>
+        </p:nvSpPr>
+        <p:spPr bwMode="auto">
+          <a:xfrm>
+            <a:off x="4477934" y="3284634"/>
+            <a:ext cx="720080" cy="1224136"/>
+          </a:xfrm>
+          <a:prstGeom prst="rect">
+            <a:avLst/>
+          </a:prstGeom>
+          <a:solidFill>
+            <a:schemeClr val="bg2">
+              <a:lumMod val="20000"/>
+              <a:lumOff val="80000"/>
+            </a:schemeClr>
+          </a:solidFill>
+          <a:ln w="25400" cap="flat" cmpd="sng" algn="ctr">
+            <a:solidFill>
+              <a:schemeClr val="tx1"/>
+            </a:solidFill>
+            <a:prstDash val="solid"/>
+            <a:round/>
+            <a:headEnd type="none" w="med" len="med"/>
+            <a:tailEnd type="none" w="med" len="med"/>
+          </a:ln>
+          <a:effectLst/>
+        </p:spPr>
+        <p:txBody>
+          <a:bodyPr vert="horz" wrap="square" lIns="91440" tIns="45720" rIns="91440" bIns="45720" numCol="1" rtlCol="0" anchor="t" anchorCtr="0" compatLnSpc="1">
+            <a:prstTxWarp prst="textNoShape">
+              <a:avLst/>
+            </a:prstTxWarp>
+          </a:bodyPr>
+          <a:lstStyle/>
+          <a:p>
+            <a:pPr defTabSz="914400" eaLnBrk="0" fontAlgn="base" hangingPunct="0">
+              <a:spcBef>
+                <a:spcPct val="0"/>
+              </a:spcBef>
+              <a:spcAft>
+                <a:spcPct val="0"/>
+              </a:spcAft>
+            </a:pPr>
+            <a:endParaRPr lang="en-US" sz="2000" dirty="0">
+              <a:latin typeface="Arial" charset="0"/>
+              <a:ea typeface="ヒラギノ角ゴ Pro W3" charset="-128"/>
+              <a:cs typeface="ヒラギノ角ゴ Pro W3" charset="-128"/>
+            </a:endParaRPr>
+          </a:p>
+        </p:txBody>
+      </p:sp>
+      <p:sp>
+        <p:nvSpPr>
+          <p:cNvPr id="3" name="TextBox 2">
+            <a:extLst>
+              <a:ext uri="{FF2B5EF4-FFF2-40B4-BE49-F238E27FC236}">
+                <a16:creationId xmlns:a16="http://schemas.microsoft.com/office/drawing/2014/main" id="{D06A1FB4-6D89-5399-593B-CC3BC602B8F0}"/>
+              </a:ext>
+            </a:extLst>
+          </p:cNvPr>
+          <p:cNvSpPr txBox="1"/>
+          <p:nvPr/>
+        </p:nvSpPr>
+        <p:spPr>
+          <a:xfrm>
+            <a:off x="4866525" y="3376398"/>
+            <a:ext cx="340158" cy="369332"/>
+          </a:xfrm>
+          <a:prstGeom prst="rect">
+            <a:avLst/>
+          </a:prstGeom>
+          <a:noFill/>
+        </p:spPr>
+        <p:txBody>
+          <a:bodyPr wrap="square" rtlCol="0">
+            <a:spAutoFit/>
+          </a:bodyPr>
+          <a:lstStyle/>
+          <a:p>
+            <a:r>
+              <a:rPr lang="en-US" dirty="0"/>
+              <a:t>Q</a:t>
+            </a:r>
+          </a:p>
+        </p:txBody>
+      </p:sp>
+      <p:sp>
+        <p:nvSpPr>
+          <p:cNvPr id="10" name="TextBox 9">
+            <a:extLst>
+              <a:ext uri="{FF2B5EF4-FFF2-40B4-BE49-F238E27FC236}">
+                <a16:creationId xmlns:a16="http://schemas.microsoft.com/office/drawing/2014/main" id="{06E828A0-90D8-7AEC-E1CD-CB32F3DB92FD}"/>
+              </a:ext>
+            </a:extLst>
+          </p:cNvPr>
+          <p:cNvSpPr txBox="1"/>
+          <p:nvPr/>
+        </p:nvSpPr>
+        <p:spPr>
+          <a:xfrm>
+            <a:off x="4581633" y="3782872"/>
+            <a:ext cx="439544" cy="369332"/>
+          </a:xfrm>
+          <a:prstGeom prst="rect">
+            <a:avLst/>
+          </a:prstGeom>
+          <a:noFill/>
+        </p:spPr>
+        <p:txBody>
+          <a:bodyPr wrap="square" rtlCol="0">
+            <a:spAutoFit/>
+          </a:bodyPr>
+          <a:lstStyle/>
+          <a:p>
+            <a:r>
+              <a:rPr lang="en-US" dirty="0"/>
+              <a:t>clk</a:t>
+            </a:r>
+          </a:p>
+        </p:txBody>
+      </p:sp>
+      <p:sp>
+        <p:nvSpPr>
+          <p:cNvPr id="12" name="TextBox 11">
+            <a:extLst>
+              <a:ext uri="{FF2B5EF4-FFF2-40B4-BE49-F238E27FC236}">
+                <a16:creationId xmlns:a16="http://schemas.microsoft.com/office/drawing/2014/main" id="{B8D219F0-C7D8-04F3-6BF4-C8176B17AA05}"/>
+              </a:ext>
+            </a:extLst>
+          </p:cNvPr>
+          <p:cNvSpPr txBox="1"/>
+          <p:nvPr/>
+        </p:nvSpPr>
+        <p:spPr>
+          <a:xfrm>
+            <a:off x="4477934" y="3363335"/>
+            <a:ext cx="327334" cy="369332"/>
+          </a:xfrm>
+          <a:prstGeom prst="rect">
+            <a:avLst/>
+          </a:prstGeom>
+          <a:noFill/>
+        </p:spPr>
+        <p:txBody>
+          <a:bodyPr wrap="square" rtlCol="0">
+            <a:spAutoFit/>
+          </a:bodyPr>
+          <a:lstStyle/>
+          <a:p>
+            <a:r>
+              <a:rPr lang="en-US" dirty="0"/>
+              <a:t>D</a:t>
+            </a:r>
+          </a:p>
+        </p:txBody>
+      </p:sp>
+      <p:sp>
+        <p:nvSpPr>
+          <p:cNvPr id="13" name="Triangle 12">
+            <a:extLst>
+              <a:ext uri="{FF2B5EF4-FFF2-40B4-BE49-F238E27FC236}">
+                <a16:creationId xmlns:a16="http://schemas.microsoft.com/office/drawing/2014/main" id="{4E16B07D-7591-58EB-AE00-B7D9B097D143}"/>
+              </a:ext>
+            </a:extLst>
+          </p:cNvPr>
+          <p:cNvSpPr/>
+          <p:nvPr/>
+        </p:nvSpPr>
+        <p:spPr bwMode="auto">
+          <a:xfrm rot="5400000">
+            <a:off x="4443536" y="3879338"/>
+            <a:ext cx="214418" cy="145622"/>
+          </a:xfrm>
+          <a:prstGeom prst="triangle">
+            <a:avLst/>
+          </a:prstGeom>
+          <a:noFill/>
+          <a:ln w="12700" cap="flat" cmpd="sng" algn="ctr">
+            <a:solidFill>
+              <a:schemeClr val="tx1"/>
+            </a:solidFill>
+            <a:prstDash val="solid"/>
+            <a:round/>
+            <a:headEnd type="none" w="med" len="med"/>
+            <a:tailEnd type="none" w="med" len="med"/>
+          </a:ln>
+          <a:effectLst/>
+        </p:spPr>
+        <p:txBody>
+          <a:bodyPr vert="horz" wrap="square" lIns="91440" tIns="45720" rIns="91440" bIns="45720" numCol="1" rtlCol="0" anchor="t" anchorCtr="0" compatLnSpc="1">
+            <a:prstTxWarp prst="textNoShape">
+              <a:avLst/>
+            </a:prstTxWarp>
+          </a:bodyPr>
+          <a:lstStyle/>
+          <a:p>
+            <a:pPr defTabSz="914400" eaLnBrk="0" fontAlgn="base" hangingPunct="0">
+              <a:spcBef>
+                <a:spcPct val="0"/>
+              </a:spcBef>
+              <a:spcAft>
+                <a:spcPct val="0"/>
+              </a:spcAft>
+            </a:pPr>
+            <a:endParaRPr lang="en-US" sz="2000" dirty="0">
+              <a:latin typeface="Arial" charset="0"/>
+              <a:ea typeface="ヒラギノ角ゴ Pro W3" charset="-128"/>
+              <a:cs typeface="ヒラギノ角ゴ Pro W3" charset="-128"/>
+            </a:endParaRPr>
+          </a:p>
+        </p:txBody>
+      </p:sp>
+      <p:cxnSp>
+        <p:nvCxnSpPr>
+          <p:cNvPr id="14" name="Straight Connector 13">
+            <a:extLst>
+              <a:ext uri="{FF2B5EF4-FFF2-40B4-BE49-F238E27FC236}">
+                <a16:creationId xmlns:a16="http://schemas.microsoft.com/office/drawing/2014/main" id="{1BE28DCC-B346-D7DD-DEE0-75361C705A5F}"/>
+              </a:ext>
+            </a:extLst>
+          </p:cNvPr>
+          <p:cNvCxnSpPr>
+            <a:cxnSpLocks/>
+          </p:cNvCxnSpPr>
+          <p:nvPr/>
+        </p:nvCxnSpPr>
+        <p:spPr bwMode="auto">
+          <a:xfrm flipH="1">
+            <a:off x="3123148" y="3548001"/>
+            <a:ext cx="10969" cy="0"/>
+          </a:xfrm>
+          <a:prstGeom prst="line">
+            <a:avLst/>
+          </a:prstGeom>
+          <a:solidFill>
+            <a:schemeClr val="accent1"/>
+          </a:solidFill>
+          <a:ln w="25400" cap="flat" cmpd="sng" algn="ctr">
+            <a:solidFill>
+              <a:schemeClr val="tx1"/>
+            </a:solidFill>
+            <a:prstDash val="solid"/>
+            <a:round/>
+            <a:headEnd type="none" w="med" len="med"/>
+            <a:tailEnd type="none" w="med" len="med"/>
+          </a:ln>
+          <a:effectLst/>
+        </p:spPr>
+      </p:cxnSp>
+      <p:cxnSp>
+        <p:nvCxnSpPr>
+          <p:cNvPr id="15" name="Straight Connector 14">
+            <a:extLst>
+              <a:ext uri="{FF2B5EF4-FFF2-40B4-BE49-F238E27FC236}">
+                <a16:creationId xmlns:a16="http://schemas.microsoft.com/office/drawing/2014/main" id="{297FB4E4-3969-2AAC-3ECF-530BEEBA8E40}"/>
+              </a:ext>
+            </a:extLst>
+          </p:cNvPr>
+          <p:cNvCxnSpPr>
+            <a:cxnSpLocks/>
+            <a:endCxn id="13" idx="3"/>
+          </p:cNvCxnSpPr>
+          <p:nvPr/>
+        </p:nvCxnSpPr>
+        <p:spPr bwMode="auto">
+          <a:xfrm flipV="1">
+            <a:off x="3365269" y="3952149"/>
+            <a:ext cx="1112665" cy="1434"/>
+          </a:xfrm>
+          <a:prstGeom prst="line">
+            <a:avLst/>
+          </a:prstGeom>
+          <a:solidFill>
+            <a:schemeClr val="accent1"/>
+          </a:solidFill>
+          <a:ln w="25400" cap="flat" cmpd="sng" algn="ctr">
+            <a:solidFill>
+              <a:schemeClr val="tx1"/>
+            </a:solidFill>
+            <a:prstDash val="solid"/>
+            <a:round/>
+            <a:headEnd type="none" w="med" len="med"/>
+            <a:tailEnd type="none" w="med" len="med"/>
+          </a:ln>
+          <a:effectLst/>
+        </p:spPr>
+      </p:cxnSp>
+      <p:sp>
+        <p:nvSpPr>
+          <p:cNvPr id="19" name="Rectangle 18">
+            <a:extLst>
+              <a:ext uri="{FF2B5EF4-FFF2-40B4-BE49-F238E27FC236}">
+                <a16:creationId xmlns:a16="http://schemas.microsoft.com/office/drawing/2014/main" id="{7750BF11-6513-327F-97E6-A7CA857704D3}"/>
+              </a:ext>
+            </a:extLst>
+          </p:cNvPr>
+          <p:cNvSpPr/>
+          <p:nvPr/>
+        </p:nvSpPr>
+        <p:spPr bwMode="auto">
+          <a:xfrm>
+            <a:off x="2381167" y="3288812"/>
+            <a:ext cx="720080" cy="1224136"/>
+          </a:xfrm>
+          <a:prstGeom prst="rect">
+            <a:avLst/>
+          </a:prstGeom>
+          <a:solidFill>
+            <a:schemeClr val="bg2">
+              <a:lumMod val="20000"/>
+              <a:lumOff val="80000"/>
+            </a:schemeClr>
+          </a:solidFill>
+          <a:ln w="25400" cap="flat" cmpd="sng" algn="ctr">
+            <a:solidFill>
+              <a:schemeClr val="tx1"/>
+            </a:solidFill>
+            <a:prstDash val="solid"/>
+            <a:round/>
+            <a:headEnd type="none" w="med" len="med"/>
+            <a:tailEnd type="none" w="med" len="med"/>
+          </a:ln>
+          <a:effectLst/>
+        </p:spPr>
+        <p:txBody>
+          <a:bodyPr vert="horz" wrap="square" lIns="91440" tIns="45720" rIns="91440" bIns="45720" numCol="1" rtlCol="0" anchor="t" anchorCtr="0" compatLnSpc="1">
+            <a:prstTxWarp prst="textNoShape">
+              <a:avLst/>
+            </a:prstTxWarp>
+          </a:bodyPr>
+          <a:lstStyle/>
+          <a:p>
+            <a:pPr defTabSz="914400" eaLnBrk="0" fontAlgn="base" hangingPunct="0">
+              <a:spcBef>
+                <a:spcPct val="0"/>
+              </a:spcBef>
+              <a:spcAft>
+                <a:spcPct val="0"/>
+              </a:spcAft>
+            </a:pPr>
+            <a:endParaRPr lang="en-US" sz="2000" dirty="0">
+              <a:latin typeface="Arial" charset="0"/>
+              <a:ea typeface="ヒラギノ角ゴ Pro W3" charset="-128"/>
+              <a:cs typeface="ヒラギノ角ゴ Pro W3" charset="-128"/>
+            </a:endParaRPr>
+          </a:p>
+        </p:txBody>
+      </p:sp>
+      <p:sp>
+        <p:nvSpPr>
+          <p:cNvPr id="21" name="TextBox 20">
+            <a:extLst>
+              <a:ext uri="{FF2B5EF4-FFF2-40B4-BE49-F238E27FC236}">
+                <a16:creationId xmlns:a16="http://schemas.microsoft.com/office/drawing/2014/main" id="{A2AAC6D8-50EC-6226-D5BF-B1F00D02F5FD}"/>
+              </a:ext>
+            </a:extLst>
+          </p:cNvPr>
+          <p:cNvSpPr txBox="1"/>
+          <p:nvPr/>
+        </p:nvSpPr>
+        <p:spPr>
+          <a:xfrm>
+            <a:off x="2769758" y="3363413"/>
+            <a:ext cx="340158" cy="369332"/>
+          </a:xfrm>
+          <a:prstGeom prst="rect">
+            <a:avLst/>
+          </a:prstGeom>
+          <a:noFill/>
+        </p:spPr>
+        <p:txBody>
+          <a:bodyPr wrap="square" rtlCol="0">
+            <a:spAutoFit/>
+          </a:bodyPr>
+          <a:lstStyle/>
+          <a:p>
+            <a:r>
+              <a:rPr lang="en-US" dirty="0"/>
+              <a:t>Q</a:t>
+            </a:r>
+          </a:p>
+        </p:txBody>
+      </p:sp>
+      <p:sp>
+        <p:nvSpPr>
+          <p:cNvPr id="22" name="TextBox 21">
+            <a:extLst>
+              <a:ext uri="{FF2B5EF4-FFF2-40B4-BE49-F238E27FC236}">
+                <a16:creationId xmlns:a16="http://schemas.microsoft.com/office/drawing/2014/main" id="{2463AE06-F887-10C8-04A8-437C41E247D8}"/>
+              </a:ext>
+            </a:extLst>
+          </p:cNvPr>
+          <p:cNvSpPr txBox="1"/>
+          <p:nvPr/>
+        </p:nvSpPr>
+        <p:spPr>
+          <a:xfrm>
+            <a:off x="2484866" y="3787050"/>
+            <a:ext cx="439544" cy="369332"/>
+          </a:xfrm>
+          <a:prstGeom prst="rect">
+            <a:avLst/>
+          </a:prstGeom>
+          <a:noFill/>
+        </p:spPr>
+        <p:txBody>
+          <a:bodyPr wrap="square" rtlCol="0">
+            <a:spAutoFit/>
+          </a:bodyPr>
+          <a:lstStyle/>
+          <a:p>
+            <a:r>
+              <a:rPr lang="en-US" dirty="0"/>
+              <a:t>clk</a:t>
+            </a:r>
+          </a:p>
+        </p:txBody>
+      </p:sp>
+      <p:sp>
+        <p:nvSpPr>
+          <p:cNvPr id="24" name="TextBox 23">
+            <a:extLst>
+              <a:ext uri="{FF2B5EF4-FFF2-40B4-BE49-F238E27FC236}">
+                <a16:creationId xmlns:a16="http://schemas.microsoft.com/office/drawing/2014/main" id="{963949FE-B2E6-5ACA-DD97-AF0A4B3A2BDA}"/>
+              </a:ext>
+            </a:extLst>
+          </p:cNvPr>
+          <p:cNvSpPr txBox="1"/>
+          <p:nvPr/>
+        </p:nvSpPr>
+        <p:spPr>
+          <a:xfrm>
+            <a:off x="2386482" y="3372578"/>
+            <a:ext cx="327334" cy="369332"/>
+          </a:xfrm>
+          <a:prstGeom prst="rect">
+            <a:avLst/>
+          </a:prstGeom>
+          <a:noFill/>
+        </p:spPr>
+        <p:txBody>
+          <a:bodyPr wrap="square" rtlCol="0">
+            <a:spAutoFit/>
+          </a:bodyPr>
+          <a:lstStyle/>
+          <a:p>
+            <a:r>
+              <a:rPr lang="en-US" dirty="0"/>
+              <a:t>D</a:t>
+            </a:r>
+          </a:p>
+        </p:txBody>
+      </p:sp>
+      <p:sp>
+        <p:nvSpPr>
+          <p:cNvPr id="25" name="Triangle 24">
+            <a:extLst>
+              <a:ext uri="{FF2B5EF4-FFF2-40B4-BE49-F238E27FC236}">
+                <a16:creationId xmlns:a16="http://schemas.microsoft.com/office/drawing/2014/main" id="{5B92A429-48E4-6AAC-757E-F5C7FD0F908B}"/>
+              </a:ext>
+            </a:extLst>
+          </p:cNvPr>
+          <p:cNvSpPr/>
+          <p:nvPr/>
+        </p:nvSpPr>
+        <p:spPr bwMode="auto">
+          <a:xfrm rot="5400000">
+            <a:off x="2346769" y="3883516"/>
+            <a:ext cx="214418" cy="145622"/>
+          </a:xfrm>
+          <a:prstGeom prst="triangle">
+            <a:avLst/>
+          </a:prstGeom>
+          <a:noFill/>
+          <a:ln w="12700" cap="flat" cmpd="sng" algn="ctr">
+            <a:solidFill>
+              <a:schemeClr val="tx1"/>
+            </a:solidFill>
+            <a:prstDash val="solid"/>
+            <a:round/>
+            <a:headEnd type="none" w="med" len="med"/>
+            <a:tailEnd type="none" w="med" len="med"/>
+          </a:ln>
+          <a:effectLst/>
+        </p:spPr>
+        <p:txBody>
+          <a:bodyPr vert="horz" wrap="square" lIns="91440" tIns="45720" rIns="91440" bIns="45720" numCol="1" rtlCol="0" anchor="t" anchorCtr="0" compatLnSpc="1">
+            <a:prstTxWarp prst="textNoShape">
+              <a:avLst/>
+            </a:prstTxWarp>
+          </a:bodyPr>
+          <a:lstStyle/>
+          <a:p>
+            <a:pPr defTabSz="914400" eaLnBrk="0" fontAlgn="base" hangingPunct="0">
+              <a:spcBef>
+                <a:spcPct val="0"/>
+              </a:spcBef>
+              <a:spcAft>
+                <a:spcPct val="0"/>
+              </a:spcAft>
+            </a:pPr>
+            <a:endParaRPr lang="en-US" sz="2000" dirty="0">
+              <a:latin typeface="Arial" charset="0"/>
+              <a:ea typeface="ヒラギノ角ゴ Pro W3" charset="-128"/>
+              <a:cs typeface="ヒラギノ角ゴ Pro W3" charset="-128"/>
+            </a:endParaRPr>
+          </a:p>
+        </p:txBody>
+      </p:sp>
+      <p:cxnSp>
+        <p:nvCxnSpPr>
+          <p:cNvPr id="27" name="Straight Connector 26">
+            <a:extLst>
+              <a:ext uri="{FF2B5EF4-FFF2-40B4-BE49-F238E27FC236}">
+                <a16:creationId xmlns:a16="http://schemas.microsoft.com/office/drawing/2014/main" id="{020E7BB8-F868-4418-8E92-FDB4867555B9}"/>
+              </a:ext>
+            </a:extLst>
+          </p:cNvPr>
+          <p:cNvCxnSpPr>
+            <a:cxnSpLocks/>
+          </p:cNvCxnSpPr>
+          <p:nvPr/>
+        </p:nvCxnSpPr>
+        <p:spPr bwMode="auto">
+          <a:xfrm>
+            <a:off x="2009017" y="3949378"/>
+            <a:ext cx="360040" cy="0"/>
+          </a:xfrm>
+          <a:prstGeom prst="line">
+            <a:avLst/>
+          </a:prstGeom>
+          <a:solidFill>
+            <a:schemeClr val="accent1"/>
+          </a:solidFill>
+          <a:ln w="25400" cap="flat" cmpd="sng" algn="ctr">
+            <a:solidFill>
+              <a:schemeClr val="tx1"/>
+            </a:solidFill>
+            <a:prstDash val="solid"/>
+            <a:round/>
+            <a:headEnd type="none" w="med" len="med"/>
+            <a:tailEnd type="none" w="med" len="med"/>
+          </a:ln>
+          <a:effectLst/>
+        </p:spPr>
+      </p:cxnSp>
+      <p:cxnSp>
+        <p:nvCxnSpPr>
+          <p:cNvPr id="37" name="Straight Connector 36">
+            <a:extLst>
+              <a:ext uri="{FF2B5EF4-FFF2-40B4-BE49-F238E27FC236}">
+                <a16:creationId xmlns:a16="http://schemas.microsoft.com/office/drawing/2014/main" id="{76AD778D-C02C-B8AD-5712-EF9024AFA074}"/>
+              </a:ext>
+            </a:extLst>
+          </p:cNvPr>
+          <p:cNvCxnSpPr>
+            <a:cxnSpLocks/>
+            <a:stCxn id="21" idx="3"/>
+            <a:endCxn id="12" idx="1"/>
+          </p:cNvCxnSpPr>
+          <p:nvPr/>
+        </p:nvCxnSpPr>
+        <p:spPr bwMode="auto">
+          <a:xfrm flipV="1">
+            <a:off x="3109916" y="3548001"/>
+            <a:ext cx="1368018" cy="78"/>
+          </a:xfrm>
+          <a:prstGeom prst="line">
+            <a:avLst/>
+          </a:prstGeom>
+          <a:solidFill>
+            <a:schemeClr val="accent1"/>
+          </a:solidFill>
+          <a:ln w="25400" cap="flat" cmpd="sng" algn="ctr">
+            <a:solidFill>
+              <a:schemeClr val="tx1"/>
+            </a:solidFill>
+            <a:prstDash val="solid"/>
+            <a:round/>
+            <a:headEnd type="none" w="med" len="med"/>
+            <a:tailEnd type="none" w="med" len="med"/>
+          </a:ln>
+          <a:effectLst/>
+        </p:spPr>
+      </p:cxnSp>
+      <p:cxnSp>
+        <p:nvCxnSpPr>
+          <p:cNvPr id="44" name="Straight Connector 43">
+            <a:extLst>
+              <a:ext uri="{FF2B5EF4-FFF2-40B4-BE49-F238E27FC236}">
+                <a16:creationId xmlns:a16="http://schemas.microsoft.com/office/drawing/2014/main" id="{EF622D7E-EEB7-0C42-D060-6D810D061FD5}"/>
+              </a:ext>
+            </a:extLst>
+          </p:cNvPr>
+          <p:cNvCxnSpPr>
+            <a:cxnSpLocks/>
+            <a:stCxn id="41" idx="3"/>
+            <a:endCxn id="24" idx="1"/>
+          </p:cNvCxnSpPr>
+          <p:nvPr/>
+        </p:nvCxnSpPr>
+        <p:spPr bwMode="auto">
+          <a:xfrm>
+            <a:off x="1722615" y="3555945"/>
+            <a:ext cx="663867" cy="1299"/>
+          </a:xfrm>
+          <a:prstGeom prst="line">
+            <a:avLst/>
+          </a:prstGeom>
+          <a:solidFill>
+            <a:schemeClr val="accent1"/>
+          </a:solidFill>
+          <a:ln w="25400" cap="flat" cmpd="sng" algn="ctr">
+            <a:solidFill>
+              <a:schemeClr val="tx1"/>
+            </a:solidFill>
+            <a:prstDash val="solid"/>
+            <a:round/>
+            <a:headEnd type="none" w="med" len="med"/>
+            <a:tailEnd type="none" w="med" len="med"/>
+          </a:ln>
+          <a:effectLst/>
+        </p:spPr>
+      </p:cxnSp>
+      <p:cxnSp>
+        <p:nvCxnSpPr>
+          <p:cNvPr id="45" name="Straight Connector 44">
+            <a:extLst>
+              <a:ext uri="{FF2B5EF4-FFF2-40B4-BE49-F238E27FC236}">
+                <a16:creationId xmlns:a16="http://schemas.microsoft.com/office/drawing/2014/main" id="{7B7A7ABE-3227-06CA-0CAF-121029770C0C}"/>
+              </a:ext>
+            </a:extLst>
+          </p:cNvPr>
+          <p:cNvCxnSpPr>
+            <a:cxnSpLocks/>
+          </p:cNvCxnSpPr>
+          <p:nvPr/>
+        </p:nvCxnSpPr>
+        <p:spPr bwMode="auto">
+          <a:xfrm>
+            <a:off x="6406975" y="3896702"/>
+            <a:ext cx="0" cy="991182"/>
+          </a:xfrm>
+          <a:prstGeom prst="line">
+            <a:avLst/>
+          </a:prstGeom>
+          <a:solidFill>
+            <a:schemeClr val="accent1"/>
+          </a:solidFill>
+          <a:ln w="28575" cap="flat" cmpd="sng" algn="ctr">
+            <a:solidFill>
+              <a:schemeClr val="tx1"/>
+            </a:solidFill>
+            <a:prstDash val="solid"/>
+            <a:round/>
+            <a:headEnd type="none" w="med" len="med"/>
+            <a:tailEnd type="none" w="med" len="med"/>
+          </a:ln>
+          <a:effectLst/>
+        </p:spPr>
+      </p:cxnSp>
+      <p:cxnSp>
+        <p:nvCxnSpPr>
+          <p:cNvPr id="47" name="Straight Connector 46">
+            <a:extLst>
+              <a:ext uri="{FF2B5EF4-FFF2-40B4-BE49-F238E27FC236}">
+                <a16:creationId xmlns:a16="http://schemas.microsoft.com/office/drawing/2014/main" id="{FCF74B31-60E4-FECC-1F0F-1BC243D368FC}"/>
+              </a:ext>
+            </a:extLst>
+          </p:cNvPr>
+          <p:cNvCxnSpPr>
+            <a:cxnSpLocks/>
+            <a:endCxn id="55" idx="3"/>
+          </p:cNvCxnSpPr>
+          <p:nvPr/>
+        </p:nvCxnSpPr>
+        <p:spPr bwMode="auto">
+          <a:xfrm flipH="1" flipV="1">
+            <a:off x="1746377" y="4862945"/>
+            <a:ext cx="4657016" cy="16626"/>
+          </a:xfrm>
+          <a:prstGeom prst="line">
+            <a:avLst/>
+          </a:prstGeom>
+          <a:solidFill>
+            <a:schemeClr val="accent1"/>
+          </a:solidFill>
+          <a:ln w="28575" cap="flat" cmpd="sng" algn="ctr">
+            <a:solidFill>
+              <a:schemeClr val="tx1"/>
+            </a:solidFill>
+            <a:prstDash val="solid"/>
+            <a:round/>
+            <a:headEnd type="none" w="med" len="med"/>
+            <a:tailEnd type="none" w="med" len="med"/>
+          </a:ln>
+          <a:effectLst/>
+        </p:spPr>
+      </p:cxnSp>
+      <p:cxnSp>
+        <p:nvCxnSpPr>
+          <p:cNvPr id="51" name="Straight Connector 50">
+            <a:extLst>
+              <a:ext uri="{FF2B5EF4-FFF2-40B4-BE49-F238E27FC236}">
+                <a16:creationId xmlns:a16="http://schemas.microsoft.com/office/drawing/2014/main" id="{2E4E7F31-B17C-E6F4-5596-E749E95FC73B}"/>
+              </a:ext>
+            </a:extLst>
+          </p:cNvPr>
+          <p:cNvCxnSpPr>
+            <a:cxnSpLocks/>
+          </p:cNvCxnSpPr>
+          <p:nvPr/>
+        </p:nvCxnSpPr>
+        <p:spPr bwMode="auto">
+          <a:xfrm>
+            <a:off x="3342749" y="3941208"/>
+            <a:ext cx="0" cy="946676"/>
+          </a:xfrm>
+          <a:prstGeom prst="line">
+            <a:avLst/>
+          </a:prstGeom>
+          <a:solidFill>
+            <a:schemeClr val="accent1"/>
+          </a:solidFill>
+          <a:ln w="28575" cap="flat" cmpd="sng" algn="ctr">
+            <a:solidFill>
+              <a:schemeClr val="tx1"/>
+            </a:solidFill>
+            <a:prstDash val="solid"/>
+            <a:round/>
+            <a:headEnd type="none" w="med" len="med"/>
+            <a:tailEnd type="none" w="med" len="med"/>
+          </a:ln>
+          <a:effectLst/>
+        </p:spPr>
+      </p:cxnSp>
+      <p:cxnSp>
+        <p:nvCxnSpPr>
+          <p:cNvPr id="53" name="Straight Connector 52">
+            <a:extLst>
+              <a:ext uri="{FF2B5EF4-FFF2-40B4-BE49-F238E27FC236}">
+                <a16:creationId xmlns:a16="http://schemas.microsoft.com/office/drawing/2014/main" id="{1EC6497D-E462-E322-66AE-1FAF9AD3C0E7}"/>
+              </a:ext>
+            </a:extLst>
+          </p:cNvPr>
+          <p:cNvCxnSpPr>
+            <a:cxnSpLocks/>
+          </p:cNvCxnSpPr>
+          <p:nvPr/>
+        </p:nvCxnSpPr>
+        <p:spPr bwMode="auto">
+          <a:xfrm>
+            <a:off x="2009017" y="3941208"/>
+            <a:ext cx="0" cy="946676"/>
+          </a:xfrm>
+          <a:prstGeom prst="line">
+            <a:avLst/>
+          </a:prstGeom>
+          <a:solidFill>
+            <a:schemeClr val="accent1"/>
+          </a:solidFill>
+          <a:ln w="28575" cap="flat" cmpd="sng" algn="ctr">
+            <a:solidFill>
+              <a:schemeClr val="tx1"/>
+            </a:solidFill>
+            <a:prstDash val="solid"/>
+            <a:round/>
+            <a:headEnd type="none" w="med" len="med"/>
+            <a:tailEnd type="none" w="med" len="med"/>
+          </a:ln>
+          <a:effectLst/>
+        </p:spPr>
+      </p:cxnSp>
+      <p:sp>
+        <p:nvSpPr>
+          <p:cNvPr id="55" name="TextBox 54">
+            <a:extLst>
+              <a:ext uri="{FF2B5EF4-FFF2-40B4-BE49-F238E27FC236}">
+                <a16:creationId xmlns:a16="http://schemas.microsoft.com/office/drawing/2014/main" id="{7B08F865-1A90-E6EE-7AFA-8B04C5538C59}"/>
+              </a:ext>
+            </a:extLst>
+          </p:cNvPr>
+          <p:cNvSpPr txBox="1"/>
+          <p:nvPr/>
+        </p:nvSpPr>
+        <p:spPr>
+          <a:xfrm>
+            <a:off x="1306833" y="4678279"/>
+            <a:ext cx="439544" cy="369332"/>
+          </a:xfrm>
+          <a:prstGeom prst="rect">
+            <a:avLst/>
+          </a:prstGeom>
+          <a:noFill/>
+        </p:spPr>
+        <p:txBody>
+          <a:bodyPr wrap="square" rtlCol="0">
+            <a:spAutoFit/>
+          </a:bodyPr>
+          <a:lstStyle/>
+          <a:p>
+            <a:r>
+              <a:rPr lang="en-US" dirty="0"/>
+              <a:t>clk</a:t>
+            </a:r>
+          </a:p>
+        </p:txBody>
+      </p:sp>
+      <p:sp>
+        <p:nvSpPr>
+          <p:cNvPr id="58" name="Rounded Rectangle 57">
+            <a:extLst>
+              <a:ext uri="{FF2B5EF4-FFF2-40B4-BE49-F238E27FC236}">
+                <a16:creationId xmlns:a16="http://schemas.microsoft.com/office/drawing/2014/main" id="{1F4E05D9-B921-AA6E-B078-364A87F8A822}"/>
+              </a:ext>
+            </a:extLst>
+          </p:cNvPr>
+          <p:cNvSpPr/>
+          <p:nvPr/>
+        </p:nvSpPr>
+        <p:spPr>
+          <a:xfrm>
+            <a:off x="2207054" y="2647905"/>
+            <a:ext cx="4400567" cy="2441758"/>
+          </a:xfrm>
+          <a:prstGeom prst="roundRect">
+            <a:avLst/>
+          </a:prstGeom>
+          <a:solidFill>
+            <a:schemeClr val="bg1">
+              <a:alpha val="0"/>
+            </a:schemeClr>
+          </a:solidFill>
+          <a:ln w="19050">
+            <a:solidFill>
+              <a:schemeClr val="tx1"/>
+            </a:solidFill>
+            <a:prstDash val="dash"/>
+          </a:ln>
+        </p:spPr>
+        <p:style>
+          <a:lnRef idx="2">
+            <a:schemeClr val="accent1">
+              <a:shade val="50000"/>
+            </a:schemeClr>
+          </a:lnRef>
+          <a:fillRef idx="1">
+            <a:schemeClr val="accent1"/>
+          </a:fillRef>
+          <a:effectRef idx="0">
+            <a:schemeClr val="accent1"/>
+          </a:effectRef>
+          <a:fontRef idx="minor">
+            <a:schemeClr val="lt1"/>
+          </a:fontRef>
+        </p:style>
+        <p:txBody>
+          <a:bodyPr rtlCol="0" anchor="ctr"/>
+          <a:lstStyle/>
+          <a:p>
+            <a:pPr algn="ctr"/>
+            <a:endParaRPr lang="en-NO"/>
+          </a:p>
+        </p:txBody>
+      </p:sp>
+      <p:sp>
+        <p:nvSpPr>
+          <p:cNvPr id="59" name="TextBox 58">
+            <a:extLst>
+              <a:ext uri="{FF2B5EF4-FFF2-40B4-BE49-F238E27FC236}">
+                <a16:creationId xmlns:a16="http://schemas.microsoft.com/office/drawing/2014/main" id="{B9EF2306-6151-DE6E-5F44-EA2A69244FCC}"/>
+              </a:ext>
+            </a:extLst>
+          </p:cNvPr>
+          <p:cNvSpPr txBox="1"/>
+          <p:nvPr/>
+        </p:nvSpPr>
+        <p:spPr>
+          <a:xfrm>
+            <a:off x="2976374" y="2603013"/>
+            <a:ext cx="2526141" cy="369332"/>
+          </a:xfrm>
+          <a:prstGeom prst="rect">
+            <a:avLst/>
+          </a:prstGeom>
+          <a:noFill/>
+        </p:spPr>
+        <p:txBody>
+          <a:bodyPr wrap="none" rtlCol="0">
+            <a:spAutoFit/>
+          </a:bodyPr>
+          <a:lstStyle/>
+          <a:p>
+            <a:r>
+              <a:rPr lang="nb-NO" dirty="0"/>
+              <a:t>Synchronization registers</a:t>
+            </a:r>
+            <a:endParaRPr lang="en-NO" dirty="0"/>
+          </a:p>
+        </p:txBody>
+      </p:sp>
+      <p:sp>
+        <p:nvSpPr>
+          <p:cNvPr id="16" name="TextBox 15">
+            <a:extLst>
+              <a:ext uri="{FF2B5EF4-FFF2-40B4-BE49-F238E27FC236}">
+                <a16:creationId xmlns:a16="http://schemas.microsoft.com/office/drawing/2014/main" id="{3E894ACF-8A51-B82C-06F5-7C7134883C34}"/>
+              </a:ext>
+            </a:extLst>
+          </p:cNvPr>
+          <p:cNvSpPr txBox="1"/>
+          <p:nvPr/>
+        </p:nvSpPr>
+        <p:spPr>
+          <a:xfrm>
+            <a:off x="3146418" y="3196455"/>
+            <a:ext cx="1372492" cy="369332"/>
+          </a:xfrm>
+          <a:prstGeom prst="rect">
+            <a:avLst/>
+          </a:prstGeom>
+          <a:noFill/>
+        </p:spPr>
+        <p:txBody>
+          <a:bodyPr wrap="none" rtlCol="0">
+            <a:spAutoFit/>
+          </a:bodyPr>
+          <a:lstStyle/>
+          <a:p>
+            <a:r>
+              <a:rPr lang="en-GB" dirty="0"/>
+              <a:t>e</a:t>
+            </a:r>
+            <a:r>
+              <a:rPr lang="en-NO" dirty="0"/>
+              <a:t>nable_r1_n</a:t>
+            </a:r>
+          </a:p>
+        </p:txBody>
+      </p:sp>
+      <p:sp>
+        <p:nvSpPr>
+          <p:cNvPr id="48" name="TextBox 47">
+            <a:extLst>
+              <a:ext uri="{FF2B5EF4-FFF2-40B4-BE49-F238E27FC236}">
+                <a16:creationId xmlns:a16="http://schemas.microsoft.com/office/drawing/2014/main" id="{738E7F94-071C-C508-B857-66CA8CD21A9F}"/>
+              </a:ext>
+            </a:extLst>
+          </p:cNvPr>
+          <p:cNvSpPr txBox="1"/>
+          <p:nvPr/>
+        </p:nvSpPr>
+        <p:spPr>
+          <a:xfrm>
+            <a:off x="5166836" y="3228607"/>
+            <a:ext cx="1372492" cy="369332"/>
+          </a:xfrm>
+          <a:prstGeom prst="rect">
+            <a:avLst/>
+          </a:prstGeom>
+          <a:noFill/>
+        </p:spPr>
+        <p:txBody>
+          <a:bodyPr wrap="none" rtlCol="0">
+            <a:spAutoFit/>
+          </a:bodyPr>
+          <a:lstStyle/>
+          <a:p>
+            <a:r>
+              <a:rPr lang="en-GB" dirty="0"/>
+              <a:t>e</a:t>
+            </a:r>
+            <a:r>
+              <a:rPr lang="en-NO" dirty="0"/>
+              <a:t>nable_r2_n</a:t>
+            </a:r>
+          </a:p>
+        </p:txBody>
+      </p:sp>
+      <p:sp>
+        <p:nvSpPr>
+          <p:cNvPr id="18" name="Rectangle 17">
+            <a:extLst>
+              <a:ext uri="{FF2B5EF4-FFF2-40B4-BE49-F238E27FC236}">
+                <a16:creationId xmlns:a16="http://schemas.microsoft.com/office/drawing/2014/main" id="{FEC537C8-C9C3-B274-4F47-59F31901D317}"/>
+              </a:ext>
+            </a:extLst>
+          </p:cNvPr>
+          <p:cNvSpPr/>
+          <p:nvPr/>
+        </p:nvSpPr>
+        <p:spPr bwMode="auto">
+          <a:xfrm>
+            <a:off x="9587374" y="2647905"/>
+            <a:ext cx="720080" cy="1224136"/>
+          </a:xfrm>
+          <a:prstGeom prst="rect">
+            <a:avLst/>
+          </a:prstGeom>
+          <a:solidFill>
+            <a:schemeClr val="bg2">
+              <a:lumMod val="20000"/>
+              <a:lumOff val="80000"/>
+            </a:schemeClr>
+          </a:solidFill>
+          <a:ln w="25400" cap="flat" cmpd="sng" algn="ctr">
+            <a:solidFill>
+              <a:schemeClr val="tx1"/>
+            </a:solidFill>
+            <a:prstDash val="solid"/>
+            <a:round/>
+            <a:headEnd type="none" w="med" len="med"/>
+            <a:tailEnd type="none" w="med" len="med"/>
+          </a:ln>
+          <a:effectLst/>
+        </p:spPr>
+        <p:txBody>
+          <a:bodyPr vert="horz" wrap="square" lIns="91440" tIns="45720" rIns="91440" bIns="45720" numCol="1" rtlCol="0" anchor="t" anchorCtr="0" compatLnSpc="1">
+            <a:prstTxWarp prst="textNoShape">
+              <a:avLst/>
+            </a:prstTxWarp>
+          </a:bodyPr>
+          <a:lstStyle/>
+          <a:p>
+            <a:pPr defTabSz="914400" eaLnBrk="0" fontAlgn="base" hangingPunct="0">
+              <a:spcBef>
+                <a:spcPct val="0"/>
+              </a:spcBef>
+              <a:spcAft>
+                <a:spcPct val="0"/>
+              </a:spcAft>
+            </a:pPr>
+            <a:endParaRPr lang="en-US" sz="2000" dirty="0">
+              <a:latin typeface="Arial" charset="0"/>
+              <a:ea typeface="ヒラギノ角ゴ Pro W3" charset="-128"/>
+              <a:cs typeface="ヒラギノ角ゴ Pro W3" charset="-128"/>
+            </a:endParaRPr>
+          </a:p>
+        </p:txBody>
+      </p:sp>
+      <p:sp>
+        <p:nvSpPr>
+          <p:cNvPr id="26" name="TextBox 25">
+            <a:extLst>
+              <a:ext uri="{FF2B5EF4-FFF2-40B4-BE49-F238E27FC236}">
+                <a16:creationId xmlns:a16="http://schemas.microsoft.com/office/drawing/2014/main" id="{51B1CAD7-3000-8400-71CE-CE5A2409C07C}"/>
+              </a:ext>
+            </a:extLst>
+          </p:cNvPr>
+          <p:cNvSpPr txBox="1"/>
+          <p:nvPr/>
+        </p:nvSpPr>
+        <p:spPr>
+          <a:xfrm>
+            <a:off x="9975965" y="2791921"/>
+            <a:ext cx="340158" cy="369332"/>
+          </a:xfrm>
+          <a:prstGeom prst="rect">
+            <a:avLst/>
+          </a:prstGeom>
+          <a:noFill/>
+        </p:spPr>
+        <p:txBody>
+          <a:bodyPr wrap="square" rtlCol="0">
+            <a:spAutoFit/>
+          </a:bodyPr>
+          <a:lstStyle/>
+          <a:p>
+            <a:r>
+              <a:rPr lang="en-US" dirty="0"/>
+              <a:t>Q</a:t>
+            </a:r>
+          </a:p>
+        </p:txBody>
+      </p:sp>
+      <p:sp>
+        <p:nvSpPr>
+          <p:cNvPr id="28" name="TextBox 27">
+            <a:extLst>
+              <a:ext uri="{FF2B5EF4-FFF2-40B4-BE49-F238E27FC236}">
+                <a16:creationId xmlns:a16="http://schemas.microsoft.com/office/drawing/2014/main" id="{2ECC8B79-9EFE-EDAB-BEC8-D2A80C8326D2}"/>
+              </a:ext>
+            </a:extLst>
+          </p:cNvPr>
+          <p:cNvSpPr txBox="1"/>
+          <p:nvPr/>
+        </p:nvSpPr>
+        <p:spPr>
+          <a:xfrm>
+            <a:off x="9691073" y="3146143"/>
+            <a:ext cx="439544" cy="369332"/>
+          </a:xfrm>
+          <a:prstGeom prst="rect">
+            <a:avLst/>
+          </a:prstGeom>
+          <a:noFill/>
+        </p:spPr>
+        <p:txBody>
+          <a:bodyPr wrap="square" rtlCol="0">
+            <a:spAutoFit/>
+          </a:bodyPr>
+          <a:lstStyle/>
+          <a:p>
+            <a:r>
+              <a:rPr lang="en-US" dirty="0"/>
+              <a:t>clk</a:t>
+            </a:r>
+          </a:p>
+        </p:txBody>
+      </p:sp>
+      <p:sp>
+        <p:nvSpPr>
+          <p:cNvPr id="31" name="TextBox 30">
+            <a:extLst>
+              <a:ext uri="{FF2B5EF4-FFF2-40B4-BE49-F238E27FC236}">
+                <a16:creationId xmlns:a16="http://schemas.microsoft.com/office/drawing/2014/main" id="{E38771F2-082E-235D-2A7E-D2F564BE73F1}"/>
+              </a:ext>
+            </a:extLst>
+          </p:cNvPr>
+          <p:cNvSpPr txBox="1"/>
+          <p:nvPr/>
+        </p:nvSpPr>
+        <p:spPr>
+          <a:xfrm>
+            <a:off x="9587374" y="2791921"/>
+            <a:ext cx="327334" cy="369332"/>
+          </a:xfrm>
+          <a:prstGeom prst="rect">
+            <a:avLst/>
+          </a:prstGeom>
+          <a:noFill/>
+        </p:spPr>
+        <p:txBody>
+          <a:bodyPr wrap="square" rtlCol="0">
+            <a:spAutoFit/>
+          </a:bodyPr>
+          <a:lstStyle/>
+          <a:p>
+            <a:r>
+              <a:rPr lang="en-US" dirty="0"/>
+              <a:t>D</a:t>
+            </a:r>
+          </a:p>
+        </p:txBody>
+      </p:sp>
+      <p:sp>
+        <p:nvSpPr>
+          <p:cNvPr id="32" name="Triangle 31">
+            <a:extLst>
+              <a:ext uri="{FF2B5EF4-FFF2-40B4-BE49-F238E27FC236}">
+                <a16:creationId xmlns:a16="http://schemas.microsoft.com/office/drawing/2014/main" id="{E92AE424-C7B8-EA2B-1BC8-720ECB7E058C}"/>
+              </a:ext>
+            </a:extLst>
+          </p:cNvPr>
+          <p:cNvSpPr/>
+          <p:nvPr/>
+        </p:nvSpPr>
+        <p:spPr bwMode="auto">
+          <a:xfrm rot="5400000">
+            <a:off x="9552976" y="3242609"/>
+            <a:ext cx="214418" cy="145622"/>
+          </a:xfrm>
+          <a:prstGeom prst="triangle">
+            <a:avLst/>
+          </a:prstGeom>
+          <a:noFill/>
+          <a:ln w="12700" cap="flat" cmpd="sng" algn="ctr">
+            <a:solidFill>
+              <a:schemeClr val="tx1"/>
+            </a:solidFill>
+            <a:prstDash val="solid"/>
+            <a:round/>
+            <a:headEnd type="none" w="med" len="med"/>
+            <a:tailEnd type="none" w="med" len="med"/>
+          </a:ln>
+          <a:effectLst/>
+        </p:spPr>
+        <p:txBody>
+          <a:bodyPr vert="horz" wrap="square" lIns="91440" tIns="45720" rIns="91440" bIns="45720" numCol="1" rtlCol="0" anchor="t" anchorCtr="0" compatLnSpc="1">
+            <a:prstTxWarp prst="textNoShape">
+              <a:avLst/>
+            </a:prstTxWarp>
+          </a:bodyPr>
+          <a:lstStyle/>
+          <a:p>
+            <a:pPr defTabSz="914400" eaLnBrk="0" fontAlgn="base" hangingPunct="0">
+              <a:spcBef>
+                <a:spcPct val="0"/>
+              </a:spcBef>
+              <a:spcAft>
+                <a:spcPct val="0"/>
+              </a:spcAft>
+            </a:pPr>
+            <a:endParaRPr lang="en-US" sz="2000" dirty="0">
+              <a:latin typeface="Arial" charset="0"/>
+              <a:ea typeface="ヒラギノ角ゴ Pro W3" charset="-128"/>
+              <a:cs typeface="ヒラギノ角ゴ Pro W3" charset="-128"/>
+            </a:endParaRPr>
+          </a:p>
+        </p:txBody>
+      </p:sp>
+      <p:cxnSp>
+        <p:nvCxnSpPr>
+          <p:cNvPr id="33" name="Straight Connector 32">
+            <a:extLst>
+              <a:ext uri="{FF2B5EF4-FFF2-40B4-BE49-F238E27FC236}">
+                <a16:creationId xmlns:a16="http://schemas.microsoft.com/office/drawing/2014/main" id="{256B2CC8-3B62-86DB-BBED-688294E21901}"/>
+              </a:ext>
+            </a:extLst>
+          </p:cNvPr>
+          <p:cNvCxnSpPr>
+            <a:cxnSpLocks/>
+          </p:cNvCxnSpPr>
+          <p:nvPr/>
+        </p:nvCxnSpPr>
+        <p:spPr bwMode="auto">
+          <a:xfrm>
+            <a:off x="10307454" y="2972345"/>
+            <a:ext cx="375077" cy="0"/>
+          </a:xfrm>
+          <a:prstGeom prst="line">
+            <a:avLst/>
+          </a:prstGeom>
+          <a:solidFill>
+            <a:schemeClr val="accent1"/>
+          </a:solidFill>
+          <a:ln w="25400" cap="flat" cmpd="sng" algn="ctr">
+            <a:solidFill>
+              <a:schemeClr val="tx1"/>
+            </a:solidFill>
+            <a:prstDash val="solid"/>
+            <a:round/>
+            <a:headEnd type="none" w="med" len="med"/>
+            <a:tailEnd type="none" w="med" len="med"/>
+          </a:ln>
+          <a:effectLst/>
+        </p:spPr>
+      </p:cxnSp>
+    </p:spTree>
+    <p:extLst>
+      <p:ext uri="{BB962C8B-B14F-4D97-AF65-F5344CB8AC3E}">
+        <p14:creationId xmlns:p14="http://schemas.microsoft.com/office/powerpoint/2010/main" val="1806915609"/>
+      </p:ext>
+    </p:extLst>
+  </p:cSld>
+  <p:clrMapOvr>
+    <a:masterClrMapping/>
+  </p:clrMapOvr>
+  <p:timing>
+    <p:tnLst>
+      <p:par>
+        <p:cTn id="1" dur="indefinite" restart="never" nodeType="tmRoot">
+          <p:childTnLst>
+            <p:seq concurrent="1" nextAc="seek">
+              <p:cTn id="2" dur="indefinite" nodeType="mainSeq">
+                <p:childTnLst>
+                  <p:par>
+                    <p:cTn id="3" fill="hold">
+                      <p:stCondLst>
+                        <p:cond delay="indefinite"/>
+                      </p:stCondLst>
+                      <p:childTnLst>
+                        <p:par>
+                          <p:cTn id="4" fill="hold">
+                            <p:stCondLst>
+                              <p:cond delay="0"/>
+                            </p:stCondLst>
+                            <p:childTnLst>
+                              <p:par>
+                                <p:cTn id="5" presetID="1" presetClass="entr" presetSubtype="0" fill="hold" grpId="0" nodeType="clickEffect">
+                                  <p:stCondLst>
+                                    <p:cond delay="0"/>
+                                  </p:stCondLst>
+                                  <p:childTnLst>
+                                    <p:set>
+                                      <p:cBhvr>
+                                        <p:cTn id="6" dur="1" fill="hold">
+                                          <p:stCondLst>
+                                            <p:cond delay="0"/>
+                                          </p:stCondLst>
+                                        </p:cTn>
+                                        <p:tgtEl>
+                                          <p:spTgt spid="4"/>
+                                        </p:tgtEl>
+                                        <p:attrNameLst>
+                                          <p:attrName>style.visibility</p:attrName>
+                                        </p:attrNameLst>
+                                      </p:cBhvr>
+                                      <p:to>
+                                        <p:strVal val="visible"/>
+                                      </p:to>
+                                    </p:set>
+                                  </p:childTnLst>
+                                </p:cTn>
+                              </p:par>
+                              <p:par>
+                                <p:cTn id="7" presetID="1" presetClass="entr" presetSubtype="0" fill="hold" grpId="0" nodeType="withEffect">
+                                  <p:stCondLst>
+                                    <p:cond delay="0"/>
+                                  </p:stCondLst>
+                                  <p:childTnLst>
+                                    <p:set>
+                                      <p:cBhvr>
+                                        <p:cTn id="8" dur="1" fill="hold">
+                                          <p:stCondLst>
+                                            <p:cond delay="0"/>
+                                          </p:stCondLst>
+                                        </p:cTn>
+                                        <p:tgtEl>
+                                          <p:spTgt spid="5"/>
+                                        </p:tgtEl>
+                                        <p:attrNameLst>
+                                          <p:attrName>style.visibility</p:attrName>
+                                        </p:attrNameLst>
+                                      </p:cBhvr>
+                                      <p:to>
+                                        <p:strVal val="visible"/>
+                                      </p:to>
+                                    </p:set>
+                                  </p:childTnLst>
+                                </p:cTn>
+                              </p:par>
+                              <p:par>
+                                <p:cTn id="9" presetID="1" presetClass="entr" presetSubtype="0" fill="hold" grpId="0" nodeType="withEffect">
+                                  <p:stCondLst>
+                                    <p:cond delay="0"/>
+                                  </p:stCondLst>
+                                  <p:childTnLst>
+                                    <p:set>
+                                      <p:cBhvr>
+                                        <p:cTn id="10" dur="1" fill="hold">
+                                          <p:stCondLst>
+                                            <p:cond delay="0"/>
+                                          </p:stCondLst>
+                                        </p:cTn>
+                                        <p:tgtEl>
+                                          <p:spTgt spid="6"/>
+                                        </p:tgtEl>
+                                        <p:attrNameLst>
+                                          <p:attrName>style.visibility</p:attrName>
+                                        </p:attrNameLst>
+                                      </p:cBhvr>
+                                      <p:to>
+                                        <p:strVal val="visible"/>
+                                      </p:to>
+                                    </p:set>
+                                  </p:childTnLst>
+                                </p:cTn>
+                              </p:par>
+                              <p:par>
+                                <p:cTn id="11" presetID="1" presetClass="entr" presetSubtype="0" fill="hold" grpId="0" nodeType="withEffect">
+                                  <p:stCondLst>
+                                    <p:cond delay="0"/>
+                                  </p:stCondLst>
+                                  <p:childTnLst>
+                                    <p:set>
+                                      <p:cBhvr>
+                                        <p:cTn id="12" dur="1" fill="hold">
+                                          <p:stCondLst>
+                                            <p:cond delay="0"/>
+                                          </p:stCondLst>
+                                        </p:cTn>
+                                        <p:tgtEl>
+                                          <p:spTgt spid="7"/>
+                                        </p:tgtEl>
+                                        <p:attrNameLst>
+                                          <p:attrName>style.visibility</p:attrName>
+                                        </p:attrNameLst>
+                                      </p:cBhvr>
+                                      <p:to>
+                                        <p:strVal val="visible"/>
+                                      </p:to>
+                                    </p:set>
+                                  </p:childTnLst>
+                                </p:cTn>
+                              </p:par>
+                              <p:par>
+                                <p:cTn id="13" presetID="1" presetClass="entr" presetSubtype="0" fill="hold" grpId="0" nodeType="withEffect">
+                                  <p:stCondLst>
+                                    <p:cond delay="0"/>
+                                  </p:stCondLst>
+                                  <p:childTnLst>
+                                    <p:set>
+                                      <p:cBhvr>
+                                        <p:cTn id="14" dur="1" fill="hold">
+                                          <p:stCondLst>
+                                            <p:cond delay="0"/>
+                                          </p:stCondLst>
+                                        </p:cTn>
+                                        <p:tgtEl>
+                                          <p:spTgt spid="8"/>
+                                        </p:tgtEl>
+                                        <p:attrNameLst>
+                                          <p:attrName>style.visibility</p:attrName>
+                                        </p:attrNameLst>
+                                      </p:cBhvr>
+                                      <p:to>
+                                        <p:strVal val="visible"/>
+                                      </p:to>
+                                    </p:set>
+                                  </p:childTnLst>
+                                </p:cTn>
+                              </p:par>
+                              <p:par>
+                                <p:cTn id="15" presetID="1" presetClass="entr" presetSubtype="0" fill="hold" nodeType="withEffect">
+                                  <p:stCondLst>
+                                    <p:cond delay="0"/>
+                                  </p:stCondLst>
+                                  <p:childTnLst>
+                                    <p:set>
+                                      <p:cBhvr>
+                                        <p:cTn id="16" dur="1" fill="hold">
+                                          <p:stCondLst>
+                                            <p:cond delay="0"/>
+                                          </p:stCondLst>
+                                        </p:cTn>
+                                        <p:tgtEl>
+                                          <p:spTgt spid="9"/>
+                                        </p:tgtEl>
+                                        <p:attrNameLst>
+                                          <p:attrName>style.visibility</p:attrName>
+                                        </p:attrNameLst>
+                                      </p:cBhvr>
+                                      <p:to>
+                                        <p:strVal val="visible"/>
+                                      </p:to>
+                                    </p:set>
+                                  </p:childTnLst>
+                                </p:cTn>
+                              </p:par>
+                              <p:par>
+                                <p:cTn id="17" presetID="1" presetClass="entr" presetSubtype="0" fill="hold" nodeType="withEffect">
+                                  <p:stCondLst>
+                                    <p:cond delay="0"/>
+                                  </p:stCondLst>
+                                  <p:childTnLst>
+                                    <p:set>
+                                      <p:cBhvr>
+                                        <p:cTn id="18" dur="1" fill="hold">
+                                          <p:stCondLst>
+                                            <p:cond delay="0"/>
+                                          </p:stCondLst>
+                                        </p:cTn>
+                                        <p:tgtEl>
+                                          <p:spTgt spid="11"/>
+                                        </p:tgtEl>
+                                        <p:attrNameLst>
+                                          <p:attrName>style.visibility</p:attrName>
+                                        </p:attrNameLst>
+                                      </p:cBhvr>
+                                      <p:to>
+                                        <p:strVal val="visible"/>
+                                      </p:to>
+                                    </p:set>
+                                  </p:childTnLst>
+                                </p:cTn>
+                              </p:par>
+                              <p:par>
+                                <p:cTn id="19" presetID="1" presetClass="entr" presetSubtype="0" fill="hold" nodeType="withEffect">
+                                  <p:stCondLst>
+                                    <p:cond delay="0"/>
+                                  </p:stCondLst>
+                                  <p:childTnLst>
+                                    <p:set>
+                                      <p:cBhvr>
+                                        <p:cTn id="20" dur="1" fill="hold">
+                                          <p:stCondLst>
+                                            <p:cond delay="0"/>
+                                          </p:stCondLst>
+                                        </p:cTn>
+                                        <p:tgtEl>
+                                          <p:spTgt spid="17"/>
+                                        </p:tgtEl>
+                                        <p:attrNameLst>
+                                          <p:attrName>style.visibility</p:attrName>
+                                        </p:attrNameLst>
+                                      </p:cBhvr>
+                                      <p:to>
+                                        <p:strVal val="visible"/>
+                                      </p:to>
+                                    </p:set>
+                                  </p:childTnLst>
+                                </p:cTn>
+                              </p:par>
+                              <p:par>
+                                <p:cTn id="21" presetID="1" presetClass="entr" presetSubtype="0" fill="hold" nodeType="withEffect">
+                                  <p:stCondLst>
+                                    <p:cond delay="0"/>
+                                  </p:stCondLst>
+                                  <p:childTnLst>
+                                    <p:set>
+                                      <p:cBhvr>
+                                        <p:cTn id="22" dur="1" fill="hold">
+                                          <p:stCondLst>
+                                            <p:cond delay="0"/>
+                                          </p:stCondLst>
+                                        </p:cTn>
+                                        <p:tgtEl>
+                                          <p:spTgt spid="30"/>
+                                        </p:tgtEl>
+                                        <p:attrNameLst>
+                                          <p:attrName>style.visibility</p:attrName>
+                                        </p:attrNameLst>
+                                      </p:cBhvr>
+                                      <p:to>
+                                        <p:strVal val="visible"/>
+                                      </p:to>
+                                    </p:set>
+                                  </p:childTnLst>
+                                </p:cTn>
+                              </p:par>
+                              <p:par>
+                                <p:cTn id="23" presetID="1" presetClass="entr" presetSubtype="0" fill="hold" nodeType="withEffect">
+                                  <p:stCondLst>
+                                    <p:cond delay="0"/>
+                                  </p:stCondLst>
+                                  <p:childTnLst>
+                                    <p:set>
+                                      <p:cBhvr>
+                                        <p:cTn id="24" dur="1" fill="hold">
+                                          <p:stCondLst>
+                                            <p:cond delay="0"/>
+                                          </p:stCondLst>
+                                        </p:cTn>
+                                        <p:tgtEl>
+                                          <p:spTgt spid="35"/>
+                                        </p:tgtEl>
+                                        <p:attrNameLst>
+                                          <p:attrName>style.visibility</p:attrName>
+                                        </p:attrNameLst>
+                                      </p:cBhvr>
+                                      <p:to>
+                                        <p:strVal val="visible"/>
+                                      </p:to>
+                                    </p:set>
+                                  </p:childTnLst>
+                                </p:cTn>
+                              </p:par>
+                              <p:par>
+                                <p:cTn id="25" presetID="1" presetClass="entr" presetSubtype="0" fill="hold" nodeType="withEffect">
+                                  <p:stCondLst>
+                                    <p:cond delay="0"/>
+                                  </p:stCondLst>
+                                  <p:childTnLst>
+                                    <p:set>
+                                      <p:cBhvr>
+                                        <p:cTn id="26" dur="1" fill="hold">
+                                          <p:stCondLst>
+                                            <p:cond delay="0"/>
+                                          </p:stCondLst>
+                                        </p:cTn>
+                                        <p:tgtEl>
+                                          <p:spTgt spid="38"/>
+                                        </p:tgtEl>
+                                        <p:attrNameLst>
+                                          <p:attrName>style.visibility</p:attrName>
+                                        </p:attrNameLst>
+                                      </p:cBhvr>
+                                      <p:to>
+                                        <p:strVal val="visible"/>
+                                      </p:to>
+                                    </p:set>
+                                  </p:childTnLst>
+                                </p:cTn>
+                              </p:par>
+                            </p:childTnLst>
+                          </p:cTn>
+                        </p:par>
+                      </p:childTnLst>
+                    </p:cTn>
+                  </p:par>
+                  <p:par>
+                    <p:cTn id="27" fill="hold">
+                      <p:stCondLst>
+                        <p:cond delay="indefinite"/>
+                      </p:stCondLst>
+                      <p:childTnLst>
+                        <p:par>
+                          <p:cTn id="28" fill="hold">
+                            <p:stCondLst>
+                              <p:cond delay="0"/>
+                            </p:stCondLst>
+                            <p:childTnLst>
+                              <p:par>
+                                <p:cTn id="29" presetID="1" presetClass="entr" presetSubtype="0" fill="hold" grpId="0" nodeType="clickEffect">
+                                  <p:stCondLst>
+                                    <p:cond delay="0"/>
+                                  </p:stCondLst>
+                                  <p:childTnLst>
+                                    <p:set>
+                                      <p:cBhvr>
+                                        <p:cTn id="30" dur="1" fill="hold">
+                                          <p:stCondLst>
+                                            <p:cond delay="0"/>
+                                          </p:stCondLst>
+                                        </p:cTn>
+                                        <p:tgtEl>
+                                          <p:spTgt spid="2"/>
+                                        </p:tgtEl>
+                                        <p:attrNameLst>
+                                          <p:attrName>style.visibility</p:attrName>
+                                        </p:attrNameLst>
+                                      </p:cBhvr>
+                                      <p:to>
+                                        <p:strVal val="visible"/>
+                                      </p:to>
+                                    </p:set>
+                                  </p:childTnLst>
+                                </p:cTn>
+                              </p:par>
+                              <p:par>
+                                <p:cTn id="31" presetID="1" presetClass="entr" presetSubtype="0" fill="hold" grpId="0" nodeType="withEffect">
+                                  <p:stCondLst>
+                                    <p:cond delay="0"/>
+                                  </p:stCondLst>
+                                  <p:childTnLst>
+                                    <p:set>
+                                      <p:cBhvr>
+                                        <p:cTn id="32" dur="1" fill="hold">
+                                          <p:stCondLst>
+                                            <p:cond delay="0"/>
+                                          </p:stCondLst>
+                                        </p:cTn>
+                                        <p:tgtEl>
+                                          <p:spTgt spid="3"/>
+                                        </p:tgtEl>
+                                        <p:attrNameLst>
+                                          <p:attrName>style.visibility</p:attrName>
+                                        </p:attrNameLst>
+                                      </p:cBhvr>
+                                      <p:to>
+                                        <p:strVal val="visible"/>
+                                      </p:to>
+                                    </p:set>
+                                  </p:childTnLst>
+                                </p:cTn>
+                              </p:par>
+                              <p:par>
+                                <p:cTn id="33" presetID="1" presetClass="entr" presetSubtype="0" fill="hold" grpId="0" nodeType="withEffect">
+                                  <p:stCondLst>
+                                    <p:cond delay="0"/>
+                                  </p:stCondLst>
+                                  <p:childTnLst>
+                                    <p:set>
+                                      <p:cBhvr>
+                                        <p:cTn id="34" dur="1" fill="hold">
+                                          <p:stCondLst>
+                                            <p:cond delay="0"/>
+                                          </p:stCondLst>
+                                        </p:cTn>
+                                        <p:tgtEl>
+                                          <p:spTgt spid="10"/>
+                                        </p:tgtEl>
+                                        <p:attrNameLst>
+                                          <p:attrName>style.visibility</p:attrName>
+                                        </p:attrNameLst>
+                                      </p:cBhvr>
+                                      <p:to>
+                                        <p:strVal val="visible"/>
+                                      </p:to>
+                                    </p:set>
+                                  </p:childTnLst>
+                                </p:cTn>
+                              </p:par>
+                              <p:par>
+                                <p:cTn id="35" presetID="1" presetClass="entr" presetSubtype="0" fill="hold" grpId="0" nodeType="withEffect">
+                                  <p:stCondLst>
+                                    <p:cond delay="0"/>
+                                  </p:stCondLst>
+                                  <p:childTnLst>
+                                    <p:set>
+                                      <p:cBhvr>
+                                        <p:cTn id="36" dur="1" fill="hold">
+                                          <p:stCondLst>
+                                            <p:cond delay="0"/>
+                                          </p:stCondLst>
+                                        </p:cTn>
+                                        <p:tgtEl>
+                                          <p:spTgt spid="12"/>
+                                        </p:tgtEl>
+                                        <p:attrNameLst>
+                                          <p:attrName>style.visibility</p:attrName>
+                                        </p:attrNameLst>
+                                      </p:cBhvr>
+                                      <p:to>
+                                        <p:strVal val="visible"/>
+                                      </p:to>
+                                    </p:set>
+                                  </p:childTnLst>
+                                </p:cTn>
+                              </p:par>
+                              <p:par>
+                                <p:cTn id="37" presetID="1" presetClass="entr" presetSubtype="0" fill="hold" grpId="0" nodeType="withEffect">
+                                  <p:stCondLst>
+                                    <p:cond delay="0"/>
+                                  </p:stCondLst>
+                                  <p:childTnLst>
+                                    <p:set>
+                                      <p:cBhvr>
+                                        <p:cTn id="38" dur="1" fill="hold">
+                                          <p:stCondLst>
+                                            <p:cond delay="0"/>
+                                          </p:stCondLst>
+                                        </p:cTn>
+                                        <p:tgtEl>
+                                          <p:spTgt spid="13"/>
+                                        </p:tgtEl>
+                                        <p:attrNameLst>
+                                          <p:attrName>style.visibility</p:attrName>
+                                        </p:attrNameLst>
+                                      </p:cBhvr>
+                                      <p:to>
+                                        <p:strVal val="visible"/>
+                                      </p:to>
+                                    </p:set>
+                                  </p:childTnLst>
+                                </p:cTn>
+                              </p:par>
+                              <p:par>
+                                <p:cTn id="39" presetID="1" presetClass="entr" presetSubtype="0" fill="hold" nodeType="withEffect">
+                                  <p:stCondLst>
+                                    <p:cond delay="0"/>
+                                  </p:stCondLst>
+                                  <p:childTnLst>
+                                    <p:set>
+                                      <p:cBhvr>
+                                        <p:cTn id="40" dur="1" fill="hold">
+                                          <p:stCondLst>
+                                            <p:cond delay="0"/>
+                                          </p:stCondLst>
+                                        </p:cTn>
+                                        <p:tgtEl>
+                                          <p:spTgt spid="14"/>
+                                        </p:tgtEl>
+                                        <p:attrNameLst>
+                                          <p:attrName>style.visibility</p:attrName>
+                                        </p:attrNameLst>
+                                      </p:cBhvr>
+                                      <p:to>
+                                        <p:strVal val="visible"/>
+                                      </p:to>
+                                    </p:set>
+                                  </p:childTnLst>
+                                </p:cTn>
+                              </p:par>
+                              <p:par>
+                                <p:cTn id="41" presetID="1" presetClass="entr" presetSubtype="0" fill="hold" nodeType="withEffect">
+                                  <p:stCondLst>
+                                    <p:cond delay="0"/>
+                                  </p:stCondLst>
+                                  <p:childTnLst>
+                                    <p:set>
+                                      <p:cBhvr>
+                                        <p:cTn id="42" dur="1" fill="hold">
+                                          <p:stCondLst>
+                                            <p:cond delay="0"/>
+                                          </p:stCondLst>
+                                        </p:cTn>
+                                        <p:tgtEl>
+                                          <p:spTgt spid="15"/>
+                                        </p:tgtEl>
+                                        <p:attrNameLst>
+                                          <p:attrName>style.visibility</p:attrName>
+                                        </p:attrNameLst>
+                                      </p:cBhvr>
+                                      <p:to>
+                                        <p:strVal val="visible"/>
+                                      </p:to>
+                                    </p:set>
+                                  </p:childTnLst>
+                                </p:cTn>
+                              </p:par>
+                            </p:childTnLst>
+                          </p:cTn>
+                        </p:par>
+                      </p:childTnLst>
+                    </p:cTn>
+                  </p:par>
+                  <p:par>
+                    <p:cTn id="43" fill="hold">
+                      <p:stCondLst>
+                        <p:cond delay="indefinite"/>
+                      </p:stCondLst>
+                      <p:childTnLst>
+                        <p:par>
+                          <p:cTn id="44" fill="hold">
+                            <p:stCondLst>
+                              <p:cond delay="0"/>
+                            </p:stCondLst>
+                            <p:childTnLst>
+                              <p:par>
+                                <p:cTn id="45" presetID="1" presetClass="entr" presetSubtype="0" fill="hold" grpId="0" nodeType="clickEffect">
+                                  <p:stCondLst>
+                                    <p:cond delay="0"/>
+                                  </p:stCondLst>
+                                  <p:childTnLst>
+                                    <p:set>
+                                      <p:cBhvr>
+                                        <p:cTn id="46" dur="1" fill="hold">
+                                          <p:stCondLst>
+                                            <p:cond delay="0"/>
+                                          </p:stCondLst>
+                                        </p:cTn>
+                                        <p:tgtEl>
+                                          <p:spTgt spid="19"/>
+                                        </p:tgtEl>
+                                        <p:attrNameLst>
+                                          <p:attrName>style.visibility</p:attrName>
+                                        </p:attrNameLst>
+                                      </p:cBhvr>
+                                      <p:to>
+                                        <p:strVal val="visible"/>
+                                      </p:to>
+                                    </p:set>
+                                  </p:childTnLst>
+                                </p:cTn>
+                              </p:par>
+                              <p:par>
+                                <p:cTn id="47" presetID="1" presetClass="entr" presetSubtype="0" fill="hold" grpId="0" nodeType="withEffect">
+                                  <p:stCondLst>
+                                    <p:cond delay="0"/>
+                                  </p:stCondLst>
+                                  <p:childTnLst>
+                                    <p:set>
+                                      <p:cBhvr>
+                                        <p:cTn id="48" dur="1" fill="hold">
+                                          <p:stCondLst>
+                                            <p:cond delay="0"/>
+                                          </p:stCondLst>
+                                        </p:cTn>
+                                        <p:tgtEl>
+                                          <p:spTgt spid="21"/>
+                                        </p:tgtEl>
+                                        <p:attrNameLst>
+                                          <p:attrName>style.visibility</p:attrName>
+                                        </p:attrNameLst>
+                                      </p:cBhvr>
+                                      <p:to>
+                                        <p:strVal val="visible"/>
+                                      </p:to>
+                                    </p:set>
+                                  </p:childTnLst>
+                                </p:cTn>
+                              </p:par>
+                              <p:par>
+                                <p:cTn id="49" presetID="1" presetClass="entr" presetSubtype="0" fill="hold" grpId="0" nodeType="withEffect">
+                                  <p:stCondLst>
+                                    <p:cond delay="0"/>
+                                  </p:stCondLst>
+                                  <p:childTnLst>
+                                    <p:set>
+                                      <p:cBhvr>
+                                        <p:cTn id="50" dur="1" fill="hold">
+                                          <p:stCondLst>
+                                            <p:cond delay="0"/>
+                                          </p:stCondLst>
+                                        </p:cTn>
+                                        <p:tgtEl>
+                                          <p:spTgt spid="22"/>
+                                        </p:tgtEl>
+                                        <p:attrNameLst>
+                                          <p:attrName>style.visibility</p:attrName>
+                                        </p:attrNameLst>
+                                      </p:cBhvr>
+                                      <p:to>
+                                        <p:strVal val="visible"/>
+                                      </p:to>
+                                    </p:set>
+                                  </p:childTnLst>
+                                </p:cTn>
+                              </p:par>
+                              <p:par>
+                                <p:cTn id="51" presetID="1" presetClass="entr" presetSubtype="0" fill="hold" grpId="0" nodeType="withEffect">
+                                  <p:stCondLst>
+                                    <p:cond delay="0"/>
+                                  </p:stCondLst>
+                                  <p:childTnLst>
+                                    <p:set>
+                                      <p:cBhvr>
+                                        <p:cTn id="52" dur="1" fill="hold">
+                                          <p:stCondLst>
+                                            <p:cond delay="0"/>
+                                          </p:stCondLst>
+                                        </p:cTn>
+                                        <p:tgtEl>
+                                          <p:spTgt spid="24"/>
+                                        </p:tgtEl>
+                                        <p:attrNameLst>
+                                          <p:attrName>style.visibility</p:attrName>
+                                        </p:attrNameLst>
+                                      </p:cBhvr>
+                                      <p:to>
+                                        <p:strVal val="visible"/>
+                                      </p:to>
+                                    </p:set>
+                                  </p:childTnLst>
+                                </p:cTn>
+                              </p:par>
+                              <p:par>
+                                <p:cTn id="53" presetID="1" presetClass="entr" presetSubtype="0" fill="hold" grpId="0" nodeType="withEffect">
+                                  <p:stCondLst>
+                                    <p:cond delay="0"/>
+                                  </p:stCondLst>
+                                  <p:childTnLst>
+                                    <p:set>
+                                      <p:cBhvr>
+                                        <p:cTn id="54" dur="1" fill="hold">
+                                          <p:stCondLst>
+                                            <p:cond delay="0"/>
+                                          </p:stCondLst>
+                                        </p:cTn>
+                                        <p:tgtEl>
+                                          <p:spTgt spid="25"/>
+                                        </p:tgtEl>
+                                        <p:attrNameLst>
+                                          <p:attrName>style.visibility</p:attrName>
+                                        </p:attrNameLst>
+                                      </p:cBhvr>
+                                      <p:to>
+                                        <p:strVal val="visible"/>
+                                      </p:to>
+                                    </p:set>
+                                  </p:childTnLst>
+                                </p:cTn>
+                              </p:par>
+                              <p:par>
+                                <p:cTn id="55" presetID="1" presetClass="entr" presetSubtype="0" fill="hold" nodeType="withEffect">
+                                  <p:stCondLst>
+                                    <p:cond delay="0"/>
+                                  </p:stCondLst>
+                                  <p:childTnLst>
+                                    <p:set>
+                                      <p:cBhvr>
+                                        <p:cTn id="56" dur="1" fill="hold">
+                                          <p:stCondLst>
+                                            <p:cond delay="0"/>
+                                          </p:stCondLst>
+                                        </p:cTn>
+                                        <p:tgtEl>
+                                          <p:spTgt spid="27"/>
+                                        </p:tgtEl>
+                                        <p:attrNameLst>
+                                          <p:attrName>style.visibility</p:attrName>
+                                        </p:attrNameLst>
+                                      </p:cBhvr>
+                                      <p:to>
+                                        <p:strVal val="visible"/>
+                                      </p:to>
+                                    </p:set>
+                                  </p:childTnLst>
+                                </p:cTn>
+                              </p:par>
+                              <p:par>
+                                <p:cTn id="57" presetID="1" presetClass="entr" presetSubtype="0" fill="hold" nodeType="withEffect">
+                                  <p:stCondLst>
+                                    <p:cond delay="0"/>
+                                  </p:stCondLst>
+                                  <p:childTnLst>
+                                    <p:set>
+                                      <p:cBhvr>
+                                        <p:cTn id="58" dur="1" fill="hold">
+                                          <p:stCondLst>
+                                            <p:cond delay="0"/>
+                                          </p:stCondLst>
+                                        </p:cTn>
+                                        <p:tgtEl>
+                                          <p:spTgt spid="37"/>
+                                        </p:tgtEl>
+                                        <p:attrNameLst>
+                                          <p:attrName>style.visibility</p:attrName>
+                                        </p:attrNameLst>
+                                      </p:cBhvr>
+                                      <p:to>
+                                        <p:strVal val="visible"/>
+                                      </p:to>
+                                    </p:set>
+                                  </p:childTnLst>
+                                </p:cTn>
+                              </p:par>
+                              <p:par>
+                                <p:cTn id="59" presetID="1" presetClass="entr" presetSubtype="0" fill="hold" nodeType="withEffect">
+                                  <p:stCondLst>
+                                    <p:cond delay="0"/>
+                                  </p:stCondLst>
+                                  <p:childTnLst>
+                                    <p:set>
+                                      <p:cBhvr>
+                                        <p:cTn id="60" dur="1" fill="hold">
+                                          <p:stCondLst>
+                                            <p:cond delay="0"/>
+                                          </p:stCondLst>
+                                        </p:cTn>
+                                        <p:tgtEl>
+                                          <p:spTgt spid="44"/>
+                                        </p:tgtEl>
+                                        <p:attrNameLst>
+                                          <p:attrName>style.visibility</p:attrName>
+                                        </p:attrNameLst>
+                                      </p:cBhvr>
+                                      <p:to>
+                                        <p:strVal val="visible"/>
+                                      </p:to>
+                                    </p:set>
+                                  </p:childTnLst>
+                                </p:cTn>
+                              </p:par>
+                              <p:par>
+                                <p:cTn id="61" presetID="1" presetClass="entr" presetSubtype="0" fill="hold" nodeType="withEffect">
+                                  <p:stCondLst>
+                                    <p:cond delay="0"/>
+                                  </p:stCondLst>
+                                  <p:childTnLst>
+                                    <p:set>
+                                      <p:cBhvr>
+                                        <p:cTn id="62" dur="1" fill="hold">
+                                          <p:stCondLst>
+                                            <p:cond delay="0"/>
+                                          </p:stCondLst>
+                                        </p:cTn>
+                                        <p:tgtEl>
+                                          <p:spTgt spid="45"/>
+                                        </p:tgtEl>
+                                        <p:attrNameLst>
+                                          <p:attrName>style.visibility</p:attrName>
+                                        </p:attrNameLst>
+                                      </p:cBhvr>
+                                      <p:to>
+                                        <p:strVal val="visible"/>
+                                      </p:to>
+                                    </p:set>
+                                  </p:childTnLst>
+                                </p:cTn>
+                              </p:par>
+                              <p:par>
+                                <p:cTn id="63" presetID="1" presetClass="entr" presetSubtype="0" fill="hold" nodeType="withEffect">
+                                  <p:stCondLst>
+                                    <p:cond delay="0"/>
+                                  </p:stCondLst>
+                                  <p:childTnLst>
+                                    <p:set>
+                                      <p:cBhvr>
+                                        <p:cTn id="64" dur="1" fill="hold">
+                                          <p:stCondLst>
+                                            <p:cond delay="0"/>
+                                          </p:stCondLst>
+                                        </p:cTn>
+                                        <p:tgtEl>
+                                          <p:spTgt spid="47"/>
+                                        </p:tgtEl>
+                                        <p:attrNameLst>
+                                          <p:attrName>style.visibility</p:attrName>
+                                        </p:attrNameLst>
+                                      </p:cBhvr>
+                                      <p:to>
+                                        <p:strVal val="visible"/>
+                                      </p:to>
+                                    </p:set>
+                                  </p:childTnLst>
+                                </p:cTn>
+                              </p:par>
+                              <p:par>
+                                <p:cTn id="65" presetID="1" presetClass="entr" presetSubtype="0" fill="hold" nodeType="withEffect">
+                                  <p:stCondLst>
+                                    <p:cond delay="0"/>
+                                  </p:stCondLst>
+                                  <p:childTnLst>
+                                    <p:set>
+                                      <p:cBhvr>
+                                        <p:cTn id="66" dur="1" fill="hold">
+                                          <p:stCondLst>
+                                            <p:cond delay="0"/>
+                                          </p:stCondLst>
+                                        </p:cTn>
+                                        <p:tgtEl>
+                                          <p:spTgt spid="51"/>
+                                        </p:tgtEl>
+                                        <p:attrNameLst>
+                                          <p:attrName>style.visibility</p:attrName>
+                                        </p:attrNameLst>
+                                      </p:cBhvr>
+                                      <p:to>
+                                        <p:strVal val="visible"/>
+                                      </p:to>
+                                    </p:set>
+                                  </p:childTnLst>
+                                </p:cTn>
+                              </p:par>
+                              <p:par>
+                                <p:cTn id="67" presetID="1" presetClass="entr" presetSubtype="0" fill="hold" nodeType="withEffect">
+                                  <p:stCondLst>
+                                    <p:cond delay="0"/>
+                                  </p:stCondLst>
+                                  <p:childTnLst>
+                                    <p:set>
+                                      <p:cBhvr>
+                                        <p:cTn id="68" dur="1" fill="hold">
+                                          <p:stCondLst>
+                                            <p:cond delay="0"/>
+                                          </p:stCondLst>
+                                        </p:cTn>
+                                        <p:tgtEl>
+                                          <p:spTgt spid="53"/>
+                                        </p:tgtEl>
+                                        <p:attrNameLst>
+                                          <p:attrName>style.visibility</p:attrName>
+                                        </p:attrNameLst>
+                                      </p:cBhvr>
+                                      <p:to>
+                                        <p:strVal val="visible"/>
+                                      </p:to>
+                                    </p:set>
+                                  </p:childTnLst>
+                                </p:cTn>
+                              </p:par>
+                              <p:par>
+                                <p:cTn id="69" presetID="1" presetClass="entr" presetSubtype="0" fill="hold" grpId="0" nodeType="withEffect">
+                                  <p:stCondLst>
+                                    <p:cond delay="0"/>
+                                  </p:stCondLst>
+                                  <p:childTnLst>
+                                    <p:set>
+                                      <p:cBhvr>
+                                        <p:cTn id="70" dur="1" fill="hold">
+                                          <p:stCondLst>
+                                            <p:cond delay="0"/>
+                                          </p:stCondLst>
+                                        </p:cTn>
+                                        <p:tgtEl>
+                                          <p:spTgt spid="55"/>
+                                        </p:tgtEl>
+                                        <p:attrNameLst>
+                                          <p:attrName>style.visibility</p:attrName>
+                                        </p:attrNameLst>
+                                      </p:cBhvr>
+                                      <p:to>
+                                        <p:strVal val="visible"/>
+                                      </p:to>
+                                    </p:set>
+                                  </p:childTnLst>
+                                </p:cTn>
+                              </p:par>
+                            </p:childTnLst>
+                          </p:cTn>
+                        </p:par>
+                      </p:childTnLst>
+                    </p:cTn>
+                  </p:par>
+                  <p:par>
+                    <p:cTn id="71" fill="hold">
+                      <p:stCondLst>
+                        <p:cond delay="indefinite"/>
+                      </p:stCondLst>
+                      <p:childTnLst>
+                        <p:par>
+                          <p:cTn id="72" fill="hold">
+                            <p:stCondLst>
+                              <p:cond delay="0"/>
+                            </p:stCondLst>
+                            <p:childTnLst>
+                              <p:par>
+                                <p:cTn id="73" presetID="1" presetClass="entr" presetSubtype="0" fill="hold" grpId="0" nodeType="clickEffect">
+                                  <p:stCondLst>
+                                    <p:cond delay="0"/>
+                                  </p:stCondLst>
+                                  <p:childTnLst>
+                                    <p:set>
+                                      <p:cBhvr>
+                                        <p:cTn id="74" dur="1" fill="hold">
+                                          <p:stCondLst>
+                                            <p:cond delay="0"/>
+                                          </p:stCondLst>
+                                        </p:cTn>
+                                        <p:tgtEl>
+                                          <p:spTgt spid="18"/>
+                                        </p:tgtEl>
+                                        <p:attrNameLst>
+                                          <p:attrName>style.visibility</p:attrName>
+                                        </p:attrNameLst>
+                                      </p:cBhvr>
+                                      <p:to>
+                                        <p:strVal val="visible"/>
+                                      </p:to>
+                                    </p:set>
+                                  </p:childTnLst>
+                                </p:cTn>
+                              </p:par>
+                              <p:par>
+                                <p:cTn id="75" presetID="1" presetClass="entr" presetSubtype="0" fill="hold" grpId="0" nodeType="withEffect">
+                                  <p:stCondLst>
+                                    <p:cond delay="0"/>
+                                  </p:stCondLst>
+                                  <p:childTnLst>
+                                    <p:set>
+                                      <p:cBhvr>
+                                        <p:cTn id="76" dur="1" fill="hold">
+                                          <p:stCondLst>
+                                            <p:cond delay="0"/>
+                                          </p:stCondLst>
+                                        </p:cTn>
+                                        <p:tgtEl>
+                                          <p:spTgt spid="26"/>
+                                        </p:tgtEl>
+                                        <p:attrNameLst>
+                                          <p:attrName>style.visibility</p:attrName>
+                                        </p:attrNameLst>
+                                      </p:cBhvr>
+                                      <p:to>
+                                        <p:strVal val="visible"/>
+                                      </p:to>
+                                    </p:set>
+                                  </p:childTnLst>
+                                </p:cTn>
+                              </p:par>
+                              <p:par>
+                                <p:cTn id="77" presetID="1" presetClass="entr" presetSubtype="0" fill="hold" grpId="0" nodeType="withEffect">
+                                  <p:stCondLst>
+                                    <p:cond delay="0"/>
+                                  </p:stCondLst>
+                                  <p:childTnLst>
+                                    <p:set>
+                                      <p:cBhvr>
+                                        <p:cTn id="78" dur="1" fill="hold">
+                                          <p:stCondLst>
+                                            <p:cond delay="0"/>
+                                          </p:stCondLst>
+                                        </p:cTn>
+                                        <p:tgtEl>
+                                          <p:spTgt spid="28"/>
+                                        </p:tgtEl>
+                                        <p:attrNameLst>
+                                          <p:attrName>style.visibility</p:attrName>
+                                        </p:attrNameLst>
+                                      </p:cBhvr>
+                                      <p:to>
+                                        <p:strVal val="visible"/>
+                                      </p:to>
+                                    </p:set>
+                                  </p:childTnLst>
+                                </p:cTn>
+                              </p:par>
+                              <p:par>
+                                <p:cTn id="79" presetID="1" presetClass="entr" presetSubtype="0" fill="hold" grpId="0" nodeType="withEffect">
+                                  <p:stCondLst>
+                                    <p:cond delay="0"/>
+                                  </p:stCondLst>
+                                  <p:childTnLst>
+                                    <p:set>
+                                      <p:cBhvr>
+                                        <p:cTn id="80" dur="1" fill="hold">
+                                          <p:stCondLst>
+                                            <p:cond delay="0"/>
+                                          </p:stCondLst>
+                                        </p:cTn>
+                                        <p:tgtEl>
+                                          <p:spTgt spid="31"/>
+                                        </p:tgtEl>
+                                        <p:attrNameLst>
+                                          <p:attrName>style.visibility</p:attrName>
+                                        </p:attrNameLst>
+                                      </p:cBhvr>
+                                      <p:to>
+                                        <p:strVal val="visible"/>
+                                      </p:to>
+                                    </p:set>
+                                  </p:childTnLst>
+                                </p:cTn>
+                              </p:par>
+                              <p:par>
+                                <p:cTn id="81" presetID="1" presetClass="entr" presetSubtype="0" fill="hold" grpId="0" nodeType="withEffect">
+                                  <p:stCondLst>
+                                    <p:cond delay="0"/>
+                                  </p:stCondLst>
+                                  <p:childTnLst>
+                                    <p:set>
+                                      <p:cBhvr>
+                                        <p:cTn id="82" dur="1" fill="hold">
+                                          <p:stCondLst>
+                                            <p:cond delay="0"/>
+                                          </p:stCondLst>
+                                        </p:cTn>
+                                        <p:tgtEl>
+                                          <p:spTgt spid="32"/>
+                                        </p:tgtEl>
+                                        <p:attrNameLst>
+                                          <p:attrName>style.visibility</p:attrName>
+                                        </p:attrNameLst>
+                                      </p:cBhvr>
+                                      <p:to>
+                                        <p:strVal val="visible"/>
+                                      </p:to>
+                                    </p:set>
+                                  </p:childTnLst>
+                                </p:cTn>
+                              </p:par>
+                              <p:par>
+                                <p:cTn id="83" presetID="1" presetClass="entr" presetSubtype="0" fill="hold" nodeType="withEffect">
+                                  <p:stCondLst>
+                                    <p:cond delay="0"/>
+                                  </p:stCondLst>
+                                  <p:childTnLst>
+                                    <p:set>
+                                      <p:cBhvr>
+                                        <p:cTn id="84" dur="1" fill="hold">
+                                          <p:stCondLst>
+                                            <p:cond delay="0"/>
+                                          </p:stCondLst>
+                                        </p:cTn>
+                                        <p:tgtEl>
+                                          <p:spTgt spid="33"/>
+                                        </p:tgtEl>
+                                        <p:attrNameLst>
+                                          <p:attrName>style.visibility</p:attrName>
+                                        </p:attrNameLst>
+                                      </p:cBhvr>
+                                      <p:to>
+                                        <p:strVal val="visible"/>
+                                      </p:to>
+                                    </p:set>
+                                  </p:childTnLst>
+                                </p:cTn>
+                              </p:par>
+                            </p:childTnLst>
+                          </p:cTn>
+                        </p:par>
+                      </p:childTnLst>
+                    </p:cTn>
+                  </p:par>
+                </p:childTnLst>
+              </p:cTn>
+              <p:prevCondLst>
+                <p:cond evt="onPrev" delay="0">
+                  <p:tgtEl>
+                    <p:sldTgt/>
+                  </p:tgtEl>
+                </p:cond>
+              </p:prevCondLst>
+              <p:nextCondLst>
+                <p:cond evt="onNext" delay="0">
+                  <p:tgtEl>
+                    <p:sldTgt/>
+                  </p:tgtEl>
+                </p:cond>
+              </p:nextCondLst>
+            </p:seq>
+          </p:childTnLst>
+        </p:cTn>
+      </p:par>
+    </p:tnLst>
+    <p:bldLst>
+      <p:bldP spid="4" grpId="0" animBg="1"/>
+      <p:bldP spid="5" grpId="0"/>
+      <p:bldP spid="6" grpId="0"/>
+      <p:bldP spid="7" grpId="0"/>
+      <p:bldP spid="8" grpId="0" animBg="1"/>
+      <p:bldP spid="2" grpId="0" animBg="1"/>
+      <p:bldP spid="3" grpId="0"/>
+      <p:bldP spid="10" grpId="0"/>
+      <p:bldP spid="12" grpId="0"/>
+      <p:bldP spid="13" grpId="0" animBg="1"/>
+      <p:bldP spid="19" grpId="0" animBg="1"/>
+      <p:bldP spid="21" grpId="0"/>
+      <p:bldP spid="22" grpId="0"/>
+      <p:bldP spid="24" grpId="0"/>
+      <p:bldP spid="25" grpId="0" animBg="1"/>
+      <p:bldP spid="55" grpId="0"/>
+      <p:bldP spid="18" grpId="0" animBg="1"/>
+      <p:bldP spid="26" grpId="0"/>
+      <p:bldP spid="28" grpId="0"/>
+      <p:bldP spid="31" grpId="0"/>
+      <p:bldP spid="32" grpId="0" animBg="1"/>
+    </p:bldLst>
+  </p:timing>
+</p:sld>
+</file>
+
+<file path=ppt/slides/slide11.xml><?xml version="1.0" encoding="utf-8"?>
 <p:sld xmlns:a="http://schemas.openxmlformats.org/drawingml/2006/main" xmlns:r="http://schemas.openxmlformats.org/officeDocument/2006/relationships" xmlns:p="http://schemas.openxmlformats.org/presentationml/2006/main">
   <p:cSld>
     <p:spTree>
@@ -18453,45 +21706,6 @@
               <a:t>Synchronization registers</a:t>
             </a:r>
             <a:endParaRPr lang="en-NO" dirty="0"/>
-          </a:p>
-        </p:txBody>
-      </p:sp>
-      <p:sp>
-        <p:nvSpPr>
-          <p:cNvPr id="16" name="TextBox 15">
-            <a:extLst>
-              <a:ext uri="{FF2B5EF4-FFF2-40B4-BE49-F238E27FC236}">
-                <a16:creationId xmlns:a16="http://schemas.microsoft.com/office/drawing/2014/main" id="{3E894ACF-8A51-B82C-06F5-7C7134883C34}"/>
-              </a:ext>
-            </a:extLst>
-          </p:cNvPr>
-          <p:cNvSpPr txBox="1"/>
-          <p:nvPr/>
-        </p:nvSpPr>
-        <p:spPr>
-          <a:xfrm>
-            <a:off x="3550502" y="2920835"/>
-            <a:ext cx="1781898" cy="369332"/>
-          </a:xfrm>
-          <a:prstGeom prst="rect">
-            <a:avLst/>
-          </a:prstGeom>
-          <a:noFill/>
-        </p:spPr>
-        <p:txBody>
-          <a:bodyPr wrap="none" rtlCol="0">
-            <a:spAutoFit/>
-          </a:bodyPr>
-          <a:lstStyle/>
-          <a:p>
-            <a:r>
-              <a:rPr lang="en-GB" dirty="0"/>
-              <a:t>e</a:t>
-            </a:r>
-            <a:r>
-              <a:rPr lang="en-NO" dirty="0"/>
-              <a:t>nable_synch_r1</a:t>
-            </a:r>
           </a:p>
         </p:txBody>
       </p:sp>

</xml_diff>